<commit_message>
doc: adding video to powerpoint
</commit_message>
<xml_diff>
--- a/doc/Group 02.pptx
+++ b/doc/Group 02.pptx
@@ -5,21 +5,18 @@
     <p:sldMasterId id="2147483648" r:id="rId1"/>
   </p:sldMasterIdLst>
   <p:notesMasterIdLst>
-    <p:notesMasterId r:id="rId11"/>
+    <p:notesMasterId r:id="rId8"/>
   </p:notesMasterIdLst>
   <p:handoutMasterIdLst>
-    <p:handoutMasterId r:id="rId12"/>
+    <p:handoutMasterId r:id="rId9"/>
   </p:handoutMasterIdLst>
   <p:sldIdLst>
     <p:sldId id="256" r:id="rId2"/>
     <p:sldId id="257" r:id="rId3"/>
     <p:sldId id="258" r:id="rId4"/>
     <p:sldId id="259" r:id="rId5"/>
-    <p:sldId id="260" r:id="rId6"/>
-    <p:sldId id="261" r:id="rId7"/>
-    <p:sldId id="262" r:id="rId8"/>
-    <p:sldId id="263" r:id="rId9"/>
-    <p:sldId id="264" r:id="rId10"/>
+    <p:sldId id="261" r:id="rId6"/>
+    <p:sldId id="260" r:id="rId7"/>
   </p:sldIdLst>
   <p:sldSz cx="9144000" cy="6858000" type="screen4x3"/>
   <p:notesSz cx="6858000" cy="9144000"/>
@@ -119,6 +116,24 @@
     </a:lvl9pPr>
   </p:defaultTextStyle>
   <p:extLst>
+    <p:ext uri="{521415D9-36F7-43E2-AB2F-B90AF26B5E84}">
+      <p14:sectionLst xmlns:p14="http://schemas.microsoft.com/office/powerpoint/2010/main">
+        <p14:section name="Title" id="{41F856C4-5757-D94A-9CB8-65501716F2DD}">
+          <p14:sldIdLst>
+            <p14:sldId id="256"/>
+          </p14:sldIdLst>
+        </p14:section>
+        <p14:section name="Emulator" id="{8C687771-6C54-024C-8F64-8521512EB3C0}">
+          <p14:sldIdLst>
+            <p14:sldId id="257"/>
+            <p14:sldId id="258"/>
+            <p14:sldId id="259"/>
+            <p14:sldId id="261"/>
+            <p14:sldId id="260"/>
+          </p14:sldIdLst>
+        </p14:section>
+      </p14:sectionLst>
+    </p:ext>
     <p:ext uri="{EFAFB233-063F-42B5-8137-9DF3F51BA10A}">
       <p15:sldGuideLst xmlns:p15="http://schemas.microsoft.com/office/powerpoint/2012/main">
         <p15:guide id="1" orient="horz" pos="2160">
@@ -154,7 +169,7 @@
 <file path=ppt/revisionInfo.xml><?xml version="1.0" encoding="utf-8"?>
 <p1510:revInfo xmlns:a="http://schemas.openxmlformats.org/drawingml/2006/main" xmlns:r="http://schemas.openxmlformats.org/officeDocument/2006/relationships" xmlns:p1510="http://schemas.microsoft.com/office/powerpoint/2015/10/main">
   <p1510:revLst>
-    <p1510:client id="{900BBACA-0FF8-6442-96A4-6DBD3920C5BD}" v="8" dt="2021-06-14T14:25:47.910"/>
+    <p1510:client id="{900BBACA-0FF8-6442-96A4-6DBD3920C5BD}" v="12" dt="2021-06-14T15:10:30.956"/>
   </p1510:revLst>
 </p1510:revInfo>
 </file>
@@ -163,19 +178,19 @@
 <pc:chgInfo xmlns:a="http://schemas.openxmlformats.org/drawingml/2006/main" xmlns:r="http://schemas.openxmlformats.org/officeDocument/2006/relationships" xmlns:ac="http://schemas.microsoft.com/office/drawing/2013/main/command" xmlns:pc="http://schemas.microsoft.com/office/powerpoint/2013/main/command">
   <pc:docChgLst>
     <pc:chgData name="Singh, Siddhant" userId="a6f2eba6-d5ab-4fbd-825a-0fa7d1537616" providerId="ADAL" clId="{900BBACA-0FF8-6442-96A4-6DBD3920C5BD}"/>
-    <pc:docChg chg="undo custSel modSld">
-      <pc:chgData name="Singh, Siddhant" userId="a6f2eba6-d5ab-4fbd-825a-0fa7d1537616" providerId="ADAL" clId="{900BBACA-0FF8-6442-96A4-6DBD3920C5BD}" dt="2021-06-14T14:34:37.880" v="323" actId="1076"/>
+    <pc:docChg chg="undo custSel addSld delSld modSld addSection delSection modSection">
+      <pc:chgData name="Singh, Siddhant" userId="a6f2eba6-d5ab-4fbd-825a-0fa7d1537616" providerId="ADAL" clId="{900BBACA-0FF8-6442-96A4-6DBD3920C5BD}" dt="2021-06-14T15:12:00.890" v="619" actId="20577"/>
       <pc:docMkLst>
         <pc:docMk/>
       </pc:docMkLst>
       <pc:sldChg chg="addSp delSp modSp mod">
-        <pc:chgData name="Singh, Siddhant" userId="a6f2eba6-d5ab-4fbd-825a-0fa7d1537616" providerId="ADAL" clId="{900BBACA-0FF8-6442-96A4-6DBD3920C5BD}" dt="2021-06-14T14:34:37.880" v="323" actId="1076"/>
+        <pc:chgData name="Singh, Siddhant" userId="a6f2eba6-d5ab-4fbd-825a-0fa7d1537616" providerId="ADAL" clId="{900BBACA-0FF8-6442-96A4-6DBD3920C5BD}" dt="2021-06-14T15:00:24.442" v="480" actId="20577"/>
         <pc:sldMkLst>
           <pc:docMk/>
           <pc:sldMk cId="954329384" sldId="256"/>
         </pc:sldMkLst>
         <pc:spChg chg="mod">
-          <ac:chgData name="Singh, Siddhant" userId="a6f2eba6-d5ab-4fbd-825a-0fa7d1537616" providerId="ADAL" clId="{900BBACA-0FF8-6442-96A4-6DBD3920C5BD}" dt="2021-06-14T14:34:37.880" v="323" actId="1076"/>
+          <ac:chgData name="Singh, Siddhant" userId="a6f2eba6-d5ab-4fbd-825a-0fa7d1537616" providerId="ADAL" clId="{900BBACA-0FF8-6442-96A4-6DBD3920C5BD}" dt="2021-06-14T15:00:24.442" v="480" actId="20577"/>
           <ac:spMkLst>
             <pc:docMk/>
             <pc:sldMk cId="954329384" sldId="256"/>
@@ -263,13 +278,302 @@
           </ac:spMkLst>
         </pc:spChg>
         <pc:grpChg chg="add mod">
-          <ac:chgData name="Singh, Siddhant" userId="a6f2eba6-d5ab-4fbd-825a-0fa7d1537616" providerId="ADAL" clId="{900BBACA-0FF8-6442-96A4-6DBD3920C5BD}" dt="2021-06-14T14:24:42.357" v="284" actId="1076"/>
+          <ac:chgData name="Singh, Siddhant" userId="a6f2eba6-d5ab-4fbd-825a-0fa7d1537616" providerId="ADAL" clId="{900BBACA-0FF8-6442-96A4-6DBD3920C5BD}" dt="2021-06-14T14:45:56.121" v="325" actId="14100"/>
           <ac:grpSpMkLst>
             <pc:docMk/>
             <pc:sldMk cId="954329384" sldId="256"/>
             <ac:grpSpMk id="14" creationId="{224BC1A5-C397-6740-B2C1-04BC6FDE4CE6}"/>
           </ac:grpSpMkLst>
         </pc:grpChg>
+      </pc:sldChg>
+      <pc:sldChg chg="new del">
+        <pc:chgData name="Singh, Siddhant" userId="a6f2eba6-d5ab-4fbd-825a-0fa7d1537616" providerId="ADAL" clId="{900BBACA-0FF8-6442-96A4-6DBD3920C5BD}" dt="2021-06-14T14:49:15.639" v="342" actId="680"/>
+        <pc:sldMkLst>
+          <pc:docMk/>
+          <pc:sldMk cId="926579435" sldId="257"/>
+        </pc:sldMkLst>
+      </pc:sldChg>
+      <pc:sldChg chg="delSp modSp del mod">
+        <pc:chgData name="Singh, Siddhant" userId="a6f2eba6-d5ab-4fbd-825a-0fa7d1537616" providerId="ADAL" clId="{900BBACA-0FF8-6442-96A4-6DBD3920C5BD}" dt="2021-06-14T14:49:05.388" v="338" actId="2696"/>
+        <pc:sldMkLst>
+          <pc:docMk/>
+          <pc:sldMk cId="1786097481" sldId="257"/>
+        </pc:sldMkLst>
+        <pc:spChg chg="mod">
+          <ac:chgData name="Singh, Siddhant" userId="a6f2eba6-d5ab-4fbd-825a-0fa7d1537616" providerId="ADAL" clId="{900BBACA-0FF8-6442-96A4-6DBD3920C5BD}" dt="2021-06-14T14:47:32.067" v="336" actId="20577"/>
+          <ac:spMkLst>
+            <pc:docMk/>
+            <pc:sldMk cId="1786097481" sldId="257"/>
+            <ac:spMk id="3" creationId="{00000000-0000-0000-0000-000000000000}"/>
+          </ac:spMkLst>
+        </pc:spChg>
+        <pc:spChg chg="del">
+          <ac:chgData name="Singh, Siddhant" userId="a6f2eba6-d5ab-4fbd-825a-0fa7d1537616" providerId="ADAL" clId="{900BBACA-0FF8-6442-96A4-6DBD3920C5BD}" dt="2021-06-14T14:47:56.959" v="337" actId="478"/>
+          <ac:spMkLst>
+            <pc:docMk/>
+            <pc:sldMk cId="1786097481" sldId="257"/>
+            <ac:spMk id="5" creationId="{00000000-0000-0000-0000-000000000000}"/>
+          </ac:spMkLst>
+        </pc:spChg>
+      </pc:sldChg>
+      <pc:sldChg chg="delSp modSp new mod">
+        <pc:chgData name="Singh, Siddhant" userId="a6f2eba6-d5ab-4fbd-825a-0fa7d1537616" providerId="ADAL" clId="{900BBACA-0FF8-6442-96A4-6DBD3920C5BD}" dt="2021-06-14T14:56:28.058" v="397" actId="20577"/>
+        <pc:sldMkLst>
+          <pc:docMk/>
+          <pc:sldMk cId="1814138918" sldId="257"/>
+        </pc:sldMkLst>
+        <pc:spChg chg="del">
+          <ac:chgData name="Singh, Siddhant" userId="a6f2eba6-d5ab-4fbd-825a-0fa7d1537616" providerId="ADAL" clId="{900BBACA-0FF8-6442-96A4-6DBD3920C5BD}" dt="2021-06-14T14:56:04.593" v="366" actId="478"/>
+          <ac:spMkLst>
+            <pc:docMk/>
+            <pc:sldMk cId="1814138918" sldId="257"/>
+            <ac:spMk id="2" creationId="{924805D8-D0B8-C541-A566-B48DDB13C855}"/>
+          </ac:spMkLst>
+        </pc:spChg>
+        <pc:spChg chg="mod">
+          <ac:chgData name="Singh, Siddhant" userId="a6f2eba6-d5ab-4fbd-825a-0fa7d1537616" providerId="ADAL" clId="{900BBACA-0FF8-6442-96A4-6DBD3920C5BD}" dt="2021-06-14T14:56:28.058" v="397" actId="20577"/>
+          <ac:spMkLst>
+            <pc:docMk/>
+            <pc:sldMk cId="1814138918" sldId="257"/>
+            <ac:spMk id="3" creationId="{3555113C-CF6F-B449-B275-E4F07B5D17ED}"/>
+          </ac:spMkLst>
+        </pc:spChg>
+        <pc:spChg chg="del">
+          <ac:chgData name="Singh, Siddhant" userId="a6f2eba6-d5ab-4fbd-825a-0fa7d1537616" providerId="ADAL" clId="{900BBACA-0FF8-6442-96A4-6DBD3920C5BD}" dt="2021-06-14T14:56:05.638" v="367" actId="478"/>
+          <ac:spMkLst>
+            <pc:docMk/>
+            <pc:sldMk cId="1814138918" sldId="257"/>
+            <ac:spMk id="4" creationId="{6EFDE6C9-084B-374D-A324-F0FAC9159324}"/>
+          </ac:spMkLst>
+        </pc:spChg>
+      </pc:sldChg>
+      <pc:sldChg chg="del">
+        <pc:chgData name="Singh, Siddhant" userId="a6f2eba6-d5ab-4fbd-825a-0fa7d1537616" providerId="ADAL" clId="{900BBACA-0FF8-6442-96A4-6DBD3920C5BD}" dt="2021-06-14T14:49:05.388" v="338" actId="2696"/>
+        <pc:sldMkLst>
+          <pc:docMk/>
+          <pc:sldMk cId="2179187587" sldId="258"/>
+        </pc:sldMkLst>
+      </pc:sldChg>
+      <pc:sldChg chg="addSp delSp modSp new mod modAnim">
+        <pc:chgData name="Singh, Siddhant" userId="a6f2eba6-d5ab-4fbd-825a-0fa7d1537616" providerId="ADAL" clId="{900BBACA-0FF8-6442-96A4-6DBD3920C5BD}" dt="2021-06-14T15:09:01.971" v="608" actId="1076"/>
+        <pc:sldMkLst>
+          <pc:docMk/>
+          <pc:sldMk cId="4254132451" sldId="258"/>
+        </pc:sldMkLst>
+        <pc:spChg chg="mod">
+          <ac:chgData name="Singh, Siddhant" userId="a6f2eba6-d5ab-4fbd-825a-0fa7d1537616" providerId="ADAL" clId="{900BBACA-0FF8-6442-96A4-6DBD3920C5BD}" dt="2021-06-14T14:57:13.952" v="441" actId="20577"/>
+          <ac:spMkLst>
+            <pc:docMk/>
+            <pc:sldMk cId="4254132451" sldId="258"/>
+            <ac:spMk id="2" creationId="{025DBAA8-8B8F-2C4D-9528-35022154E179}"/>
+          </ac:spMkLst>
+        </pc:spChg>
+        <pc:spChg chg="del">
+          <ac:chgData name="Singh, Siddhant" userId="a6f2eba6-d5ab-4fbd-825a-0fa7d1537616" providerId="ADAL" clId="{900BBACA-0FF8-6442-96A4-6DBD3920C5BD}" dt="2021-06-14T15:05:52.627" v="484"/>
+          <ac:spMkLst>
+            <pc:docMk/>
+            <pc:sldMk cId="4254132451" sldId="258"/>
+            <ac:spMk id="3" creationId="{1333F5C6-DECE-9844-8339-60B4DEFF76AF}"/>
+          </ac:spMkLst>
+        </pc:spChg>
+        <pc:picChg chg="add mod">
+          <ac:chgData name="Singh, Siddhant" userId="a6f2eba6-d5ab-4fbd-825a-0fa7d1537616" providerId="ADAL" clId="{900BBACA-0FF8-6442-96A4-6DBD3920C5BD}" dt="2021-06-14T15:09:01.971" v="608" actId="1076"/>
+          <ac:picMkLst>
+            <pc:docMk/>
+            <pc:sldMk cId="4254132451" sldId="258"/>
+            <ac:picMk id="6" creationId="{0098EFFD-E415-A14A-9D99-E95EF63A383C}"/>
+          </ac:picMkLst>
+        </pc:picChg>
+      </pc:sldChg>
+      <pc:sldChg chg="del">
+        <pc:chgData name="Singh, Siddhant" userId="a6f2eba6-d5ab-4fbd-825a-0fa7d1537616" providerId="ADAL" clId="{900BBACA-0FF8-6442-96A4-6DBD3920C5BD}" dt="2021-06-14T14:49:05.388" v="338" actId="2696"/>
+        <pc:sldMkLst>
+          <pc:docMk/>
+          <pc:sldMk cId="94465279" sldId="259"/>
+        </pc:sldMkLst>
+      </pc:sldChg>
+      <pc:sldChg chg="modSp new mod">
+        <pc:chgData name="Singh, Siddhant" userId="a6f2eba6-d5ab-4fbd-825a-0fa7d1537616" providerId="ADAL" clId="{900BBACA-0FF8-6442-96A4-6DBD3920C5BD}" dt="2021-06-14T15:06:36.080" v="531" actId="20577"/>
+        <pc:sldMkLst>
+          <pc:docMk/>
+          <pc:sldMk cId="2890495124" sldId="259"/>
+        </pc:sldMkLst>
+        <pc:spChg chg="mod">
+          <ac:chgData name="Singh, Siddhant" userId="a6f2eba6-d5ab-4fbd-825a-0fa7d1537616" providerId="ADAL" clId="{900BBACA-0FF8-6442-96A4-6DBD3920C5BD}" dt="2021-06-14T15:06:36.080" v="531" actId="20577"/>
+          <ac:spMkLst>
+            <pc:docMk/>
+            <pc:sldMk cId="2890495124" sldId="259"/>
+            <ac:spMk id="2" creationId="{43816B38-A43F-D040-95A5-7F3ADC6BCBF0}"/>
+          </ac:spMkLst>
+        </pc:spChg>
+      </pc:sldChg>
+      <pc:sldChg chg="modSp new del mod">
+        <pc:chgData name="Singh, Siddhant" userId="a6f2eba6-d5ab-4fbd-825a-0fa7d1537616" providerId="ADAL" clId="{900BBACA-0FF8-6442-96A4-6DBD3920C5BD}" dt="2021-06-14T15:06:50.017" v="565" actId="2696"/>
+        <pc:sldMkLst>
+          <pc:docMk/>
+          <pc:sldMk cId="1123508976" sldId="260"/>
+        </pc:sldMkLst>
+        <pc:spChg chg="mod">
+          <ac:chgData name="Singh, Siddhant" userId="a6f2eba6-d5ab-4fbd-825a-0fa7d1537616" providerId="ADAL" clId="{900BBACA-0FF8-6442-96A4-6DBD3920C5BD}" dt="2021-06-14T15:06:47.768" v="564" actId="20577"/>
+          <ac:spMkLst>
+            <pc:docMk/>
+            <pc:sldMk cId="1123508976" sldId="260"/>
+            <ac:spMk id="2" creationId="{8C3EDAE6-A1AC-354C-B8AC-E9AD7D02B921}"/>
+          </ac:spMkLst>
+        </pc:spChg>
+      </pc:sldChg>
+      <pc:sldChg chg="addSp delSp modSp new mod modClrScheme chgLayout">
+        <pc:chgData name="Singh, Siddhant" userId="a6f2eba6-d5ab-4fbd-825a-0fa7d1537616" providerId="ADAL" clId="{900BBACA-0FF8-6442-96A4-6DBD3920C5BD}" dt="2021-06-14T15:10:51.959" v="616" actId="1076"/>
+        <pc:sldMkLst>
+          <pc:docMk/>
+          <pc:sldMk cId="1563310146" sldId="260"/>
+        </pc:sldMkLst>
+        <pc:spChg chg="mod">
+          <ac:chgData name="Singh, Siddhant" userId="a6f2eba6-d5ab-4fbd-825a-0fa7d1537616" providerId="ADAL" clId="{900BBACA-0FF8-6442-96A4-6DBD3920C5BD}" dt="2021-06-14T15:07:47.446" v="600" actId="26606"/>
+          <ac:spMkLst>
+            <pc:docMk/>
+            <pc:sldMk cId="1563310146" sldId="260"/>
+            <ac:spMk id="2" creationId="{AE1BC82E-1B01-A24D-B49D-B7464E6C8A0C}"/>
+          </ac:spMkLst>
+        </pc:spChg>
+        <pc:spChg chg="del">
+          <ac:chgData name="Singh, Siddhant" userId="a6f2eba6-d5ab-4fbd-825a-0fa7d1537616" providerId="ADAL" clId="{900BBACA-0FF8-6442-96A4-6DBD3920C5BD}" dt="2021-06-14T15:07:30.828" v="598" actId="26606"/>
+          <ac:spMkLst>
+            <pc:docMk/>
+            <pc:sldMk cId="1563310146" sldId="260"/>
+            <ac:spMk id="3" creationId="{04B71A22-547F-BC47-B7DB-1A8BD3530C52}"/>
+          </ac:spMkLst>
+        </pc:spChg>
+        <pc:spChg chg="del">
+          <ac:chgData name="Singh, Siddhant" userId="a6f2eba6-d5ab-4fbd-825a-0fa7d1537616" providerId="ADAL" clId="{900BBACA-0FF8-6442-96A4-6DBD3920C5BD}" dt="2021-06-14T15:07:30.828" v="598" actId="26606"/>
+          <ac:spMkLst>
+            <pc:docMk/>
+            <pc:sldMk cId="1563310146" sldId="260"/>
+            <ac:spMk id="4" creationId="{C4121BC1-7028-E54B-A3E0-26B23F521690}"/>
+          </ac:spMkLst>
+        </pc:spChg>
+        <pc:spChg chg="del">
+          <ac:chgData name="Singh, Siddhant" userId="a6f2eba6-d5ab-4fbd-825a-0fa7d1537616" providerId="ADAL" clId="{900BBACA-0FF8-6442-96A4-6DBD3920C5BD}" dt="2021-06-14T15:07:30.828" v="598" actId="26606"/>
+          <ac:spMkLst>
+            <pc:docMk/>
+            <pc:sldMk cId="1563310146" sldId="260"/>
+            <ac:spMk id="5" creationId="{E1A31C67-9CF4-9348-89F6-EDC3FA310609}"/>
+          </ac:spMkLst>
+        </pc:spChg>
+        <pc:spChg chg="add mod">
+          <ac:chgData name="Singh, Siddhant" userId="a6f2eba6-d5ab-4fbd-825a-0fa7d1537616" providerId="ADAL" clId="{900BBACA-0FF8-6442-96A4-6DBD3920C5BD}" dt="2021-06-14T15:08:20.651" v="606" actId="2085"/>
+          <ac:spMkLst>
+            <pc:docMk/>
+            <pc:sldMk cId="1563310146" sldId="260"/>
+            <ac:spMk id="8" creationId="{6CF947D8-61F2-C643-8BDC-DD5029BF1D26}"/>
+          </ac:spMkLst>
+        </pc:spChg>
+        <pc:spChg chg="add del">
+          <ac:chgData name="Singh, Siddhant" userId="a6f2eba6-d5ab-4fbd-825a-0fa7d1537616" providerId="ADAL" clId="{900BBACA-0FF8-6442-96A4-6DBD3920C5BD}" dt="2021-06-14T15:07:47.446" v="600" actId="26606"/>
+          <ac:spMkLst>
+            <pc:docMk/>
+            <pc:sldMk cId="1563310146" sldId="260"/>
+            <ac:spMk id="11" creationId="{F0F4B713-8B1D-4FCA-A70C-327AAF58F29B}"/>
+          </ac:spMkLst>
+        </pc:spChg>
+        <pc:spChg chg="add del">
+          <ac:chgData name="Singh, Siddhant" userId="a6f2eba6-d5ab-4fbd-825a-0fa7d1537616" providerId="ADAL" clId="{900BBACA-0FF8-6442-96A4-6DBD3920C5BD}" dt="2021-06-14T15:07:47.446" v="600" actId="26606"/>
+          <ac:spMkLst>
+            <pc:docMk/>
+            <pc:sldMk cId="1563310146" sldId="260"/>
+            <ac:spMk id="13" creationId="{1ECB59DE-FAEF-452D-9512-4B807ACDE25C}"/>
+          </ac:spMkLst>
+        </pc:spChg>
+        <pc:spChg chg="add mod">
+          <ac:chgData name="Singh, Siddhant" userId="a6f2eba6-d5ab-4fbd-825a-0fa7d1537616" providerId="ADAL" clId="{900BBACA-0FF8-6442-96A4-6DBD3920C5BD}" dt="2021-06-14T15:07:47.446" v="600" actId="26606"/>
+          <ac:spMkLst>
+            <pc:docMk/>
+            <pc:sldMk cId="1563310146" sldId="260"/>
+            <ac:spMk id="18" creationId="{D18BB22A-8350-4E1B-B453-9E9098C500A1}"/>
+          </ac:spMkLst>
+        </pc:spChg>
+        <pc:spChg chg="add mod">
+          <ac:chgData name="Singh, Siddhant" userId="a6f2eba6-d5ab-4fbd-825a-0fa7d1537616" providerId="ADAL" clId="{900BBACA-0FF8-6442-96A4-6DBD3920C5BD}" dt="2021-06-14T15:07:47.446" v="600" actId="26606"/>
+          <ac:spMkLst>
+            <pc:docMk/>
+            <pc:sldMk cId="1563310146" sldId="260"/>
+            <ac:spMk id="20" creationId="{6B901857-EDD8-43DB-BCA0-4C8407CDC9BE}"/>
+          </ac:spMkLst>
+        </pc:spChg>
+        <pc:picChg chg="add mod">
+          <ac:chgData name="Singh, Siddhant" userId="a6f2eba6-d5ab-4fbd-825a-0fa7d1537616" providerId="ADAL" clId="{900BBACA-0FF8-6442-96A4-6DBD3920C5BD}" dt="2021-06-14T15:08:02.650" v="603" actId="1076"/>
+          <ac:picMkLst>
+            <pc:docMk/>
+            <pc:sldMk cId="1563310146" sldId="260"/>
+            <ac:picMk id="6" creationId="{70D0C587-00E2-B843-9EF6-45C4CBCB0243}"/>
+          </ac:picMkLst>
+        </pc:picChg>
+        <pc:picChg chg="add del mod ord">
+          <ac:chgData name="Singh, Siddhant" userId="a6f2eba6-d5ab-4fbd-825a-0fa7d1537616" providerId="ADAL" clId="{900BBACA-0FF8-6442-96A4-6DBD3920C5BD}" dt="2021-06-14T15:10:30.802" v="609" actId="478"/>
+          <ac:picMkLst>
+            <pc:docMk/>
+            <pc:sldMk cId="1563310146" sldId="260"/>
+            <ac:picMk id="7" creationId="{8B51FF83-18C0-B842-98FA-914EB1D4E091}"/>
+          </ac:picMkLst>
+        </pc:picChg>
+        <pc:picChg chg="add mod">
+          <ac:chgData name="Singh, Siddhant" userId="a6f2eba6-d5ab-4fbd-825a-0fa7d1537616" providerId="ADAL" clId="{900BBACA-0FF8-6442-96A4-6DBD3920C5BD}" dt="2021-06-14T15:10:51.959" v="616" actId="1076"/>
+          <ac:picMkLst>
+            <pc:docMk/>
+            <pc:sldMk cId="1563310146" sldId="260"/>
+            <ac:picMk id="9" creationId="{C883061F-C4BC-B046-85E6-6592F4FF00CD}"/>
+          </ac:picMkLst>
+        </pc:picChg>
+      </pc:sldChg>
+      <pc:sldChg chg="del">
+        <pc:chgData name="Singh, Siddhant" userId="a6f2eba6-d5ab-4fbd-825a-0fa7d1537616" providerId="ADAL" clId="{900BBACA-0FF8-6442-96A4-6DBD3920C5BD}" dt="2021-06-14T14:49:05.388" v="338" actId="2696"/>
+        <pc:sldMkLst>
+          <pc:docMk/>
+          <pc:sldMk cId="2663129352" sldId="260"/>
+        </pc:sldMkLst>
+      </pc:sldChg>
+      <pc:sldChg chg="del">
+        <pc:chgData name="Singh, Siddhant" userId="a6f2eba6-d5ab-4fbd-825a-0fa7d1537616" providerId="ADAL" clId="{900BBACA-0FF8-6442-96A4-6DBD3920C5BD}" dt="2021-06-14T14:49:05.388" v="338" actId="2696"/>
+        <pc:sldMkLst>
+          <pc:docMk/>
+          <pc:sldMk cId="1548537219" sldId="261"/>
+        </pc:sldMkLst>
+      </pc:sldChg>
+      <pc:sldChg chg="modSp add mod">
+        <pc:chgData name="Singh, Siddhant" userId="a6f2eba6-d5ab-4fbd-825a-0fa7d1537616" providerId="ADAL" clId="{900BBACA-0FF8-6442-96A4-6DBD3920C5BD}" dt="2021-06-14T15:12:00.890" v="619" actId="20577"/>
+        <pc:sldMkLst>
+          <pc:docMk/>
+          <pc:sldMk cId="2051625864" sldId="261"/>
+        </pc:sldMkLst>
+        <pc:spChg chg="mod">
+          <ac:chgData name="Singh, Siddhant" userId="a6f2eba6-d5ab-4fbd-825a-0fa7d1537616" providerId="ADAL" clId="{900BBACA-0FF8-6442-96A4-6DBD3920C5BD}" dt="2021-06-14T15:12:00.890" v="619" actId="20577"/>
+          <ac:spMkLst>
+            <pc:docMk/>
+            <pc:sldMk cId="2051625864" sldId="261"/>
+            <ac:spMk id="2" creationId="{43816B38-A43F-D040-95A5-7F3ADC6BCBF0}"/>
+          </ac:spMkLst>
+        </pc:spChg>
+      </pc:sldChg>
+      <pc:sldChg chg="del">
+        <pc:chgData name="Singh, Siddhant" userId="a6f2eba6-d5ab-4fbd-825a-0fa7d1537616" providerId="ADAL" clId="{900BBACA-0FF8-6442-96A4-6DBD3920C5BD}" dt="2021-06-14T14:49:05.388" v="338" actId="2696"/>
+        <pc:sldMkLst>
+          <pc:docMk/>
+          <pc:sldMk cId="1933405525" sldId="262"/>
+        </pc:sldMkLst>
+      </pc:sldChg>
+      <pc:sldChg chg="del">
+        <pc:chgData name="Singh, Siddhant" userId="a6f2eba6-d5ab-4fbd-825a-0fa7d1537616" providerId="ADAL" clId="{900BBACA-0FF8-6442-96A4-6DBD3920C5BD}" dt="2021-06-14T14:49:05.388" v="338" actId="2696"/>
+        <pc:sldMkLst>
+          <pc:docMk/>
+          <pc:sldMk cId="391101801" sldId="263"/>
+        </pc:sldMkLst>
+      </pc:sldChg>
+      <pc:sldChg chg="del">
+        <pc:chgData name="Singh, Siddhant" userId="a6f2eba6-d5ab-4fbd-825a-0fa7d1537616" providerId="ADAL" clId="{900BBACA-0FF8-6442-96A4-6DBD3920C5BD}" dt="2021-06-14T14:49:05.388" v="338" actId="2696"/>
+        <pc:sldMkLst>
+          <pc:docMk/>
+          <pc:sldMk cId="2304087987" sldId="264"/>
+        </pc:sldMkLst>
       </pc:sldChg>
     </pc:docChg>
   </pc:docChgLst>
@@ -3874,7 +4178,7 @@
           <a:p>
             <a:r>
               <a:rPr lang="en-US" sz="2400" dirty="0"/>
-              <a:t>Extension: A Concurrent Application of Blockchain Mining in C</a:t>
+              <a:t>Extension: A Concurrent Application of Blockchain Mining and Exchange in C</a:t>
             </a:r>
           </a:p>
         </p:txBody>
@@ -4173,76 +4477,46 @@
       </p:grpSpPr>
       <p:sp>
         <p:nvSpPr>
-          <p:cNvPr id="2" name="Subtitle 1"/>
-          <p:cNvSpPr>
-            <a:spLocks noGrp="1"/>
-          </p:cNvSpPr>
-          <p:nvPr>
-            <p:ph type="subTitle" idx="1"/>
-          </p:nvPr>
-        </p:nvSpPr>
-        <p:spPr/>
+          <p:cNvPr id="3" name="Title 2">
+            <a:extLst>
+              <a:ext uri="{FF2B5EF4-FFF2-40B4-BE49-F238E27FC236}">
+                <a16:creationId xmlns:a16="http://schemas.microsoft.com/office/drawing/2014/main" id="{3555113C-CF6F-B449-B275-E4F07B5D17ED}"/>
+              </a:ext>
+            </a:extLst>
+          </p:cNvPr>
+          <p:cNvSpPr>
+            <a:spLocks noGrp="1"/>
+          </p:cNvSpPr>
+          <p:nvPr>
+            <p:ph type="title"/>
+          </p:nvPr>
+        </p:nvSpPr>
+        <p:spPr>
+          <a:xfrm>
+            <a:off x="2808170" y="2857500"/>
+            <a:ext cx="3527659" cy="1143000"/>
+          </a:xfrm>
+        </p:spPr>
         <p:txBody>
           <a:bodyPr/>
           <a:lstStyle/>
           <a:p>
-            <a:endParaRPr lang="en-US"/>
-          </a:p>
-        </p:txBody>
-      </p:sp>
-      <p:sp>
-        <p:nvSpPr>
-          <p:cNvPr id="3" name="Title 2"/>
-          <p:cNvSpPr>
-            <a:spLocks noGrp="1"/>
-          </p:cNvSpPr>
-          <p:nvPr>
-            <p:ph type="title"/>
-          </p:nvPr>
-        </p:nvSpPr>
-        <p:spPr/>
-        <p:txBody>
-          <a:bodyPr/>
-          <a:lstStyle/>
-          <a:p>
-            <a:endParaRPr lang="en-US" dirty="0"/>
-          </a:p>
-        </p:txBody>
-      </p:sp>
-      <p:sp>
-        <p:nvSpPr>
-          <p:cNvPr id="4" name="Text Placeholder 3"/>
-          <p:cNvSpPr>
-            <a:spLocks noGrp="1"/>
-          </p:cNvSpPr>
-          <p:nvPr>
-            <p:ph type="body" sz="quarter" idx="11"/>
-          </p:nvPr>
-        </p:nvSpPr>
-        <p:spPr/>
-        <p:txBody>
-          <a:bodyPr/>
-          <a:lstStyle/>
-          <a:p>
-            <a:endParaRPr lang="en-US"/>
-          </a:p>
-        </p:txBody>
-      </p:sp>
-      <p:sp>
-        <p:nvSpPr>
-          <p:cNvPr id="5" name="Picture Placeholder 4"/>
-          <p:cNvSpPr>
-            <a:spLocks noGrp="1"/>
-          </p:cNvSpPr>
-          <p:nvPr>
-            <p:ph type="pic" sz="quarter" idx="12"/>
-          </p:nvPr>
-        </p:nvSpPr>
-        <p:spPr/>
-      </p:sp>
-      <p:sp>
-        <p:nvSpPr>
-          <p:cNvPr id="6" name="Text Placeholder 5"/>
+            <a:r>
+              <a:rPr lang="en-US" dirty="0"/>
+              <a:t>EMULATOR</a:t>
+            </a:r>
+          </a:p>
+        </p:txBody>
+      </p:sp>
+      <p:sp>
+        <p:nvSpPr>
+          <p:cNvPr id="5" name="Text Placeholder 4">
+            <a:extLst>
+              <a:ext uri="{FF2B5EF4-FFF2-40B4-BE49-F238E27FC236}">
+                <a16:creationId xmlns:a16="http://schemas.microsoft.com/office/drawing/2014/main" id="{65C3F126-CBDF-8748-A6EB-AB5299FE5A34}"/>
+              </a:ext>
+            </a:extLst>
+          </p:cNvPr>
           <p:cNvSpPr>
             <a:spLocks noGrp="1"/>
           </p:cNvSpPr>
@@ -4262,7 +4536,7 @@
     </p:spTree>
     <p:extLst>
       <p:ext uri="{BB962C8B-B14F-4D97-AF65-F5344CB8AC3E}">
-        <p14:creationId xmlns:p14="http://schemas.microsoft.com/office/powerpoint/2010/main" val="1786097481"/>
+        <p14:creationId xmlns:p14="http://schemas.microsoft.com/office/powerpoint/2010/main" val="1814138918"/>
       </p:ext>
     </p:extLst>
   </p:cSld>
@@ -4291,7 +4565,13 @@
       </p:grpSpPr>
       <p:sp>
         <p:nvSpPr>
-          <p:cNvPr id="2" name="Title 1"/>
+          <p:cNvPr id="2" name="Title 1">
+            <a:extLst>
+              <a:ext uri="{FF2B5EF4-FFF2-40B4-BE49-F238E27FC236}">
+                <a16:creationId xmlns:a16="http://schemas.microsoft.com/office/drawing/2014/main" id="{025DBAA8-8B8F-2C4D-9528-35022154E179}"/>
+              </a:ext>
+            </a:extLst>
+          </p:cNvPr>
           <p:cNvSpPr>
             <a:spLocks noGrp="1"/>
           </p:cNvSpPr>
@@ -4304,18 +4584,63 @@
           <a:bodyPr/>
           <a:lstStyle/>
           <a:p>
-            <a:endParaRPr lang="en-US"/>
-          </a:p>
-        </p:txBody>
-      </p:sp>
-      <p:sp>
-        <p:nvSpPr>
-          <p:cNvPr id="3" name="Content Placeholder 2"/>
-          <p:cNvSpPr>
-            <a:spLocks noGrp="1"/>
-          </p:cNvSpPr>
+            <a:r>
+              <a:rPr lang="en-US" dirty="0"/>
+              <a:t>Test Cases</a:t>
+            </a:r>
+          </a:p>
+        </p:txBody>
+      </p:sp>
+      <p:pic>
+        <p:nvPicPr>
+          <p:cNvPr id="6" name="Screen Recording 2021-06-14 at 6.04.25 pm.mov" descr="Screen Recording 2021-06-14 at 6.04.25 pm.mov">
+            <a:hlinkClick r:id="" action="ppaction://media"/>
+            <a:extLst>
+              <a:ext uri="{FF2B5EF4-FFF2-40B4-BE49-F238E27FC236}">
+                <a16:creationId xmlns:a16="http://schemas.microsoft.com/office/drawing/2014/main" id="{0098EFFD-E415-A14A-9D99-E95EF63A383C}"/>
+              </a:ext>
+            </a:extLst>
+          </p:cNvPr>
+          <p:cNvPicPr>
+            <a:picLocks noGrp="1" noChangeAspect="1"/>
+          </p:cNvPicPr>
           <p:nvPr>
             <p:ph idx="1"/>
+            <a:videoFile r:link="rId2"/>
+            <p:extLst>
+              <p:ext uri="{DAA4B4D4-6D71-4841-9C94-3DE7FCFB9230}">
+                <p14:media xmlns:p14="http://schemas.microsoft.com/office/powerpoint/2010/main" r:embed="rId1"/>
+              </p:ext>
+            </p:extLst>
+          </p:nvPr>
+        </p:nvPicPr>
+        <p:blipFill>
+          <a:blip r:embed="rId4"/>
+          <a:stretch>
+            <a:fillRect/>
+          </a:stretch>
+        </p:blipFill>
+        <p:spPr>
+          <a:xfrm>
+            <a:off x="356114" y="2117557"/>
+            <a:ext cx="8431772" cy="3787040"/>
+          </a:xfrm>
+        </p:spPr>
+      </p:pic>
+      <p:sp>
+        <p:nvSpPr>
+          <p:cNvPr id="4" name="Text Placeholder 3">
+            <a:extLst>
+              <a:ext uri="{FF2B5EF4-FFF2-40B4-BE49-F238E27FC236}">
+                <a16:creationId xmlns:a16="http://schemas.microsoft.com/office/drawing/2014/main" id="{5186AF30-4EA0-F641-A0DB-52220DE597DD}"/>
+              </a:ext>
+            </a:extLst>
+          </p:cNvPr>
+          <p:cNvSpPr>
+            <a:spLocks noGrp="1"/>
+          </p:cNvSpPr>
+          <p:nvPr>
+            <p:ph type="body" sz="quarter" idx="10"/>
           </p:nvPr>
         </p:nvSpPr>
         <p:spPr/>
@@ -4323,32 +4648,19 @@
           <a:bodyPr/>
           <a:lstStyle/>
           <a:p>
-            <a:endParaRPr lang="en-US"/>
-          </a:p>
-        </p:txBody>
-      </p:sp>
-      <p:sp>
-        <p:nvSpPr>
-          <p:cNvPr id="4" name="Text Placeholder 3"/>
-          <p:cNvSpPr>
-            <a:spLocks noGrp="1"/>
-          </p:cNvSpPr>
-          <p:nvPr>
-            <p:ph type="body" sz="quarter" idx="10"/>
-          </p:nvPr>
-        </p:nvSpPr>
-        <p:spPr/>
-        <p:txBody>
-          <a:bodyPr/>
-          <a:lstStyle/>
-          <a:p>
-            <a:endParaRPr lang="en-US"/>
-          </a:p>
-        </p:txBody>
-      </p:sp>
-      <p:sp>
-        <p:nvSpPr>
-          <p:cNvPr id="5" name="Text Placeholder 4"/>
+            <a:endParaRPr lang="en-US" dirty="0"/>
+          </a:p>
+        </p:txBody>
+      </p:sp>
+      <p:sp>
+        <p:nvSpPr>
+          <p:cNvPr id="5" name="Text Placeholder 4">
+            <a:extLst>
+              <a:ext uri="{FF2B5EF4-FFF2-40B4-BE49-F238E27FC236}">
+                <a16:creationId xmlns:a16="http://schemas.microsoft.com/office/drawing/2014/main" id="{FEA30847-2B22-7B4F-9DF6-60C1AACE8354}"/>
+              </a:ext>
+            </a:extLst>
+          </p:cNvPr>
           <p:cNvSpPr>
             <a:spLocks noGrp="1"/>
           </p:cNvSpPr>
@@ -4368,13 +4680,148 @@
     </p:spTree>
     <p:extLst>
       <p:ext uri="{BB962C8B-B14F-4D97-AF65-F5344CB8AC3E}">
-        <p14:creationId xmlns:p14="http://schemas.microsoft.com/office/powerpoint/2010/main" val="2179187587"/>
+        <p14:creationId xmlns:p14="http://schemas.microsoft.com/office/powerpoint/2010/main" val="4254132451"/>
       </p:ext>
     </p:extLst>
   </p:cSld>
   <p:clrMapOvr>
     <a:masterClrMapping/>
   </p:clrMapOvr>
+  <p:timing>
+    <p:tnLst>
+      <p:par>
+        <p:cTn id="1" dur="indefinite" restart="never" nodeType="tmRoot">
+          <p:childTnLst>
+            <p:seq concurrent="1" nextAc="seek">
+              <p:cTn id="2" dur="indefinite" nodeType="mainSeq">
+                <p:childTnLst>
+                  <p:par>
+                    <p:cTn id="3" fill="hold">
+                      <p:stCondLst>
+                        <p:cond delay="indefinite"/>
+                      </p:stCondLst>
+                      <p:childTnLst>
+                        <p:par>
+                          <p:cTn id="4" fill="hold">
+                            <p:stCondLst>
+                              <p:cond delay="0"/>
+                            </p:stCondLst>
+                            <p:childTnLst>
+                              <p:par>
+                                <p:cTn id="5" presetID="1" presetClass="mediacall" presetSubtype="0" fill="hold" nodeType="clickEffect">
+                                  <p:stCondLst>
+                                    <p:cond delay="0"/>
+                                  </p:stCondLst>
+                                  <p:childTnLst>
+                                    <p:cmd type="call" cmd="playFrom(0.0)">
+                                      <p:cBhvr>
+                                        <p:cTn id="6" dur="10710" fill="hold"/>
+                                        <p:tgtEl>
+                                          <p:spTgt spid="6"/>
+                                        </p:tgtEl>
+                                      </p:cBhvr>
+                                    </p:cmd>
+                                  </p:childTnLst>
+                                </p:cTn>
+                              </p:par>
+                            </p:childTnLst>
+                          </p:cTn>
+                        </p:par>
+                      </p:childTnLst>
+                    </p:cTn>
+                  </p:par>
+                </p:childTnLst>
+              </p:cTn>
+              <p:prevCondLst>
+                <p:cond evt="onPrev" delay="0">
+                  <p:tgtEl>
+                    <p:sldTgt/>
+                  </p:tgtEl>
+                </p:cond>
+              </p:prevCondLst>
+              <p:nextCondLst>
+                <p:cond evt="onNext" delay="0">
+                  <p:tgtEl>
+                    <p:sldTgt/>
+                  </p:tgtEl>
+                </p:cond>
+              </p:nextCondLst>
+            </p:seq>
+            <p:video>
+              <p:cMediaNode vol="80000">
+                <p:cTn id="7" fill="hold" display="0">
+                  <p:stCondLst>
+                    <p:cond delay="indefinite"/>
+                  </p:stCondLst>
+                </p:cTn>
+                <p:tgtEl>
+                  <p:spTgt spid="6"/>
+                </p:tgtEl>
+              </p:cMediaNode>
+            </p:video>
+            <p:seq concurrent="1" nextAc="seek">
+              <p:cTn id="8" restart="whenNotActive" fill="hold" evtFilter="cancelBubble" nodeType="interactiveSeq">
+                <p:stCondLst>
+                  <p:cond evt="onClick" delay="0">
+                    <p:tgtEl>
+                      <p:spTgt spid="6"/>
+                    </p:tgtEl>
+                  </p:cond>
+                </p:stCondLst>
+                <p:endSync evt="end" delay="0">
+                  <p:rtn val="all"/>
+                </p:endSync>
+                <p:childTnLst>
+                  <p:par>
+                    <p:cTn id="9" fill="hold">
+                      <p:stCondLst>
+                        <p:cond delay="0"/>
+                      </p:stCondLst>
+                      <p:childTnLst>
+                        <p:par>
+                          <p:cTn id="10" fill="hold">
+                            <p:stCondLst>
+                              <p:cond delay="0"/>
+                            </p:stCondLst>
+                            <p:childTnLst>
+                              <p:par>
+                                <p:cTn id="11" presetID="2" presetClass="mediacall" presetSubtype="0" fill="hold" nodeType="clickEffect">
+                                  <p:stCondLst>
+                                    <p:cond delay="0"/>
+                                  </p:stCondLst>
+                                  <p:childTnLst>
+                                    <p:cmd type="call" cmd="togglePause">
+                                      <p:cBhvr>
+                                        <p:cTn id="12" dur="1" fill="hold"/>
+                                        <p:tgtEl>
+                                          <p:spTgt spid="6"/>
+                                        </p:tgtEl>
+                                      </p:cBhvr>
+                                    </p:cmd>
+                                  </p:childTnLst>
+                                </p:cTn>
+                              </p:par>
+                            </p:childTnLst>
+                          </p:cTn>
+                        </p:par>
+                      </p:childTnLst>
+                    </p:cTn>
+                  </p:par>
+                </p:childTnLst>
+              </p:cTn>
+              <p:nextCondLst>
+                <p:cond evt="onClick" delay="0">
+                  <p:tgtEl>
+                    <p:spTgt spid="6"/>
+                  </p:tgtEl>
+                </p:cond>
+              </p:nextCondLst>
+            </p:seq>
+          </p:childTnLst>
+        </p:cTn>
+      </p:par>
+    </p:tnLst>
+  </p:timing>
 </p:sld>
 </file>
 
@@ -4397,12 +4844,18 @@
       </p:grpSpPr>
       <p:sp>
         <p:nvSpPr>
-          <p:cNvPr id="2" name="Content Placeholder 1"/>
-          <p:cNvSpPr>
-            <a:spLocks noGrp="1"/>
-          </p:cNvSpPr>
-          <p:nvPr>
-            <p:ph idx="11"/>
+          <p:cNvPr id="2" name="Title 1">
+            <a:extLst>
+              <a:ext uri="{FF2B5EF4-FFF2-40B4-BE49-F238E27FC236}">
+                <a16:creationId xmlns:a16="http://schemas.microsoft.com/office/drawing/2014/main" id="{43816B38-A43F-D040-95A5-7F3ADC6BCBF0}"/>
+              </a:ext>
+            </a:extLst>
+          </p:cNvPr>
+          <p:cNvSpPr>
+            <a:spLocks noGrp="1"/>
+          </p:cNvSpPr>
+          <p:nvPr>
+            <p:ph type="title"/>
           </p:nvPr>
         </p:nvSpPr>
         <p:spPr/>
@@ -4410,18 +4863,27 @@
           <a:bodyPr/>
           <a:lstStyle/>
           <a:p>
-            <a:endParaRPr lang="en-US"/>
-          </a:p>
-        </p:txBody>
-      </p:sp>
-      <p:sp>
-        <p:nvSpPr>
-          <p:cNvPr id="3" name="Title 2"/>
-          <p:cNvSpPr>
-            <a:spLocks noGrp="1"/>
-          </p:cNvSpPr>
-          <p:nvPr>
-            <p:ph type="title"/>
+            <a:r>
+              <a:rPr lang="en-US" dirty="0"/>
+              <a:t>Interesting Test Case #1</a:t>
+            </a:r>
+          </a:p>
+        </p:txBody>
+      </p:sp>
+      <p:sp>
+        <p:nvSpPr>
+          <p:cNvPr id="3" name="Content Placeholder 2">
+            <a:extLst>
+              <a:ext uri="{FF2B5EF4-FFF2-40B4-BE49-F238E27FC236}">
+                <a16:creationId xmlns:a16="http://schemas.microsoft.com/office/drawing/2014/main" id="{5C7406A3-AE7C-4D4C-ACD1-410459D4353B}"/>
+              </a:ext>
+            </a:extLst>
+          </p:cNvPr>
+          <p:cNvSpPr>
+            <a:spLocks noGrp="1"/>
+          </p:cNvSpPr>
+          <p:nvPr>
+            <p:ph idx="1"/>
           </p:nvPr>
         </p:nvSpPr>
         <p:spPr/>
@@ -4435,7 +4897,13 @@
       </p:sp>
       <p:sp>
         <p:nvSpPr>
-          <p:cNvPr id="4" name="Text Placeholder 3"/>
+          <p:cNvPr id="4" name="Text Placeholder 3">
+            <a:extLst>
+              <a:ext uri="{FF2B5EF4-FFF2-40B4-BE49-F238E27FC236}">
+                <a16:creationId xmlns:a16="http://schemas.microsoft.com/office/drawing/2014/main" id="{38E0A509-6420-6541-AF8C-479DE1B2A204}"/>
+              </a:ext>
+            </a:extLst>
+          </p:cNvPr>
           <p:cNvSpPr>
             <a:spLocks noGrp="1"/>
           </p:cNvSpPr>
@@ -4454,31 +4922,18 @@
       </p:sp>
       <p:sp>
         <p:nvSpPr>
-          <p:cNvPr id="5" name="Content Placeholder 4"/>
-          <p:cNvSpPr>
-            <a:spLocks noGrp="1"/>
-          </p:cNvSpPr>
-          <p:nvPr>
-            <p:ph idx="12"/>
-          </p:nvPr>
-        </p:nvSpPr>
-        <p:spPr/>
-        <p:txBody>
-          <a:bodyPr/>
-          <a:lstStyle/>
-          <a:p>
-            <a:endParaRPr lang="en-US"/>
-          </a:p>
-        </p:txBody>
-      </p:sp>
-      <p:sp>
-        <p:nvSpPr>
-          <p:cNvPr id="6" name="Text Placeholder 5"/>
-          <p:cNvSpPr>
-            <a:spLocks noGrp="1"/>
-          </p:cNvSpPr>
-          <p:nvPr>
-            <p:ph type="body" sz="quarter" idx="13"/>
+          <p:cNvPr id="5" name="Text Placeholder 4">
+            <a:extLst>
+              <a:ext uri="{FF2B5EF4-FFF2-40B4-BE49-F238E27FC236}">
+                <a16:creationId xmlns:a16="http://schemas.microsoft.com/office/drawing/2014/main" id="{8695806B-A6C7-BA40-A63A-83C31D55ACE1}"/>
+              </a:ext>
+            </a:extLst>
+          </p:cNvPr>
+          <p:cNvSpPr>
+            <a:spLocks noGrp="1"/>
+          </p:cNvSpPr>
+          <p:nvPr>
+            <p:ph type="body" sz="quarter" idx="12"/>
           </p:nvPr>
         </p:nvSpPr>
         <p:spPr/>
@@ -4493,7 +4948,7 @@
     </p:spTree>
     <p:extLst>
       <p:ext uri="{BB962C8B-B14F-4D97-AF65-F5344CB8AC3E}">
-        <p14:creationId xmlns:p14="http://schemas.microsoft.com/office/powerpoint/2010/main" val="94465279"/>
+        <p14:creationId xmlns:p14="http://schemas.microsoft.com/office/powerpoint/2010/main" val="2890495124"/>
       </p:ext>
     </p:extLst>
   </p:cSld>
@@ -4522,12 +4977,18 @@
       </p:grpSpPr>
       <p:sp>
         <p:nvSpPr>
-          <p:cNvPr id="2" name="Content Placeholder 1"/>
-          <p:cNvSpPr>
-            <a:spLocks noGrp="1"/>
-          </p:cNvSpPr>
-          <p:nvPr>
-            <p:ph idx="11"/>
+          <p:cNvPr id="2" name="Title 1">
+            <a:extLst>
+              <a:ext uri="{FF2B5EF4-FFF2-40B4-BE49-F238E27FC236}">
+                <a16:creationId xmlns:a16="http://schemas.microsoft.com/office/drawing/2014/main" id="{43816B38-A43F-D040-95A5-7F3ADC6BCBF0}"/>
+              </a:ext>
+            </a:extLst>
+          </p:cNvPr>
+          <p:cNvSpPr>
+            <a:spLocks noGrp="1"/>
+          </p:cNvSpPr>
+          <p:nvPr>
+            <p:ph type="title"/>
           </p:nvPr>
         </p:nvSpPr>
         <p:spPr/>
@@ -4535,18 +4996,32 @@
           <a:bodyPr/>
           <a:lstStyle/>
           <a:p>
-            <a:endParaRPr lang="en-US"/>
-          </a:p>
-        </p:txBody>
-      </p:sp>
-      <p:sp>
-        <p:nvSpPr>
-          <p:cNvPr id="3" name="Title 2"/>
-          <p:cNvSpPr>
-            <a:spLocks noGrp="1"/>
-          </p:cNvSpPr>
-          <p:nvPr>
-            <p:ph type="title"/>
+            <a:r>
+              <a:rPr lang="en-US" dirty="0"/>
+              <a:t>Interesting Test </a:t>
+            </a:r>
+            <a:r>
+              <a:rPr lang="en-US"/>
+              <a:t>Case #2</a:t>
+            </a:r>
+            <a:endParaRPr lang="en-US" dirty="0"/>
+          </a:p>
+        </p:txBody>
+      </p:sp>
+      <p:sp>
+        <p:nvSpPr>
+          <p:cNvPr id="3" name="Content Placeholder 2">
+            <a:extLst>
+              <a:ext uri="{FF2B5EF4-FFF2-40B4-BE49-F238E27FC236}">
+                <a16:creationId xmlns:a16="http://schemas.microsoft.com/office/drawing/2014/main" id="{5C7406A3-AE7C-4D4C-ACD1-410459D4353B}"/>
+              </a:ext>
+            </a:extLst>
+          </p:cNvPr>
+          <p:cNvSpPr>
+            <a:spLocks noGrp="1"/>
+          </p:cNvSpPr>
+          <p:nvPr>
+            <p:ph idx="1"/>
           </p:nvPr>
         </p:nvSpPr>
         <p:spPr/>
@@ -4560,7 +5035,13 @@
       </p:sp>
       <p:sp>
         <p:nvSpPr>
-          <p:cNvPr id="4" name="Text Placeholder 3"/>
+          <p:cNvPr id="4" name="Text Placeholder 3">
+            <a:extLst>
+              <a:ext uri="{FF2B5EF4-FFF2-40B4-BE49-F238E27FC236}">
+                <a16:creationId xmlns:a16="http://schemas.microsoft.com/office/drawing/2014/main" id="{38E0A509-6420-6541-AF8C-479DE1B2A204}"/>
+              </a:ext>
+            </a:extLst>
+          </p:cNvPr>
           <p:cNvSpPr>
             <a:spLocks noGrp="1"/>
           </p:cNvSpPr>
@@ -4579,50 +5060,18 @@
       </p:sp>
       <p:sp>
         <p:nvSpPr>
-          <p:cNvPr id="5" name="Content Placeholder 4"/>
-          <p:cNvSpPr>
-            <a:spLocks noGrp="1"/>
-          </p:cNvSpPr>
-          <p:nvPr>
-            <p:ph idx="12"/>
-          </p:nvPr>
-        </p:nvSpPr>
-        <p:spPr/>
-        <p:txBody>
-          <a:bodyPr/>
-          <a:lstStyle/>
-          <a:p>
-            <a:endParaRPr lang="en-US"/>
-          </a:p>
-        </p:txBody>
-      </p:sp>
-      <p:sp>
-        <p:nvSpPr>
-          <p:cNvPr id="6" name="Text Placeholder 5"/>
-          <p:cNvSpPr>
-            <a:spLocks noGrp="1"/>
-          </p:cNvSpPr>
-          <p:nvPr>
-            <p:ph type="body" sz="quarter" idx="14"/>
-          </p:nvPr>
-        </p:nvSpPr>
-        <p:spPr/>
-        <p:txBody>
-          <a:bodyPr/>
-          <a:lstStyle/>
-          <a:p>
-            <a:endParaRPr lang="en-US"/>
-          </a:p>
-        </p:txBody>
-      </p:sp>
-      <p:sp>
-        <p:nvSpPr>
-          <p:cNvPr id="7" name="Text Placeholder 6"/>
-          <p:cNvSpPr>
-            <a:spLocks noGrp="1"/>
-          </p:cNvSpPr>
-          <p:nvPr>
-            <p:ph type="body" sz="quarter" idx="15"/>
+          <p:cNvPr id="5" name="Text Placeholder 4">
+            <a:extLst>
+              <a:ext uri="{FF2B5EF4-FFF2-40B4-BE49-F238E27FC236}">
+                <a16:creationId xmlns:a16="http://schemas.microsoft.com/office/drawing/2014/main" id="{8695806B-A6C7-BA40-A63A-83C31D55ACE1}"/>
+              </a:ext>
+            </a:extLst>
+          </p:cNvPr>
+          <p:cNvSpPr>
+            <a:spLocks noGrp="1"/>
+          </p:cNvSpPr>
+          <p:nvPr>
+            <p:ph type="body" sz="quarter" idx="12"/>
           </p:nvPr>
         </p:nvSpPr>
         <p:spPr/>
@@ -4637,7 +5086,7 @@
     </p:spTree>
     <p:extLst>
       <p:ext uri="{BB962C8B-B14F-4D97-AF65-F5344CB8AC3E}">
-        <p14:creationId xmlns:p14="http://schemas.microsoft.com/office/powerpoint/2010/main" val="2663129352"/>
+        <p14:creationId xmlns:p14="http://schemas.microsoft.com/office/powerpoint/2010/main" val="2051625864"/>
       </p:ext>
     </p:extLst>
   </p:cSld>
@@ -4666,15 +5115,61 @@
       </p:grpSpPr>
       <p:sp>
         <p:nvSpPr>
-          <p:cNvPr id="2" name="Content Placeholder 1"/>
-          <p:cNvSpPr>
-            <a:spLocks noGrp="1"/>
-          </p:cNvSpPr>
-          <p:nvPr>
-            <p:ph idx="11"/>
-          </p:nvPr>
-        </p:nvSpPr>
-        <p:spPr/>
+          <p:cNvPr id="2" name="Title 1">
+            <a:extLst>
+              <a:ext uri="{FF2B5EF4-FFF2-40B4-BE49-F238E27FC236}">
+                <a16:creationId xmlns:a16="http://schemas.microsoft.com/office/drawing/2014/main" id="{AE1BC82E-1B01-A24D-B49D-B7464E6C8A0C}"/>
+              </a:ext>
+            </a:extLst>
+          </p:cNvPr>
+          <p:cNvSpPr>
+            <a:spLocks noGrp="1"/>
+          </p:cNvSpPr>
+          <p:nvPr>
+            <p:ph type="title"/>
+          </p:nvPr>
+        </p:nvSpPr>
+        <p:spPr>
+          <a:xfrm>
+            <a:off x="457200" y="1487908"/>
+            <a:ext cx="8229600" cy="507556"/>
+          </a:xfrm>
+        </p:spPr>
+        <p:txBody>
+          <a:bodyPr anchor="ctr">
+            <a:normAutofit/>
+          </a:bodyPr>
+          <a:lstStyle/>
+          <a:p>
+            <a:r>
+              <a:rPr lang="en-US" dirty="0"/>
+              <a:t>Cyclic File Dependencies</a:t>
+            </a:r>
+          </a:p>
+        </p:txBody>
+      </p:sp>
+      <p:sp>
+        <p:nvSpPr>
+          <p:cNvPr id="18" name="Text Placeholder 3">
+            <a:extLst>
+              <a:ext uri="{FF2B5EF4-FFF2-40B4-BE49-F238E27FC236}">
+                <a16:creationId xmlns:a16="http://schemas.microsoft.com/office/drawing/2014/main" id="{D18BB22A-8350-4E1B-B453-9E9098C500A1}"/>
+              </a:ext>
+            </a:extLst>
+          </p:cNvPr>
+          <p:cNvSpPr>
+            <a:spLocks noGrp="1"/>
+          </p:cNvSpPr>
+          <p:nvPr>
+            <p:ph type="body" sz="quarter" idx="10"/>
+          </p:nvPr>
+        </p:nvSpPr>
+        <p:spPr>
+          <a:xfrm>
+            <a:off x="6340638" y="469900"/>
+            <a:ext cx="2346162" cy="312291"/>
+          </a:xfrm>
+        </p:spPr>
         <p:txBody>
           <a:bodyPr/>
           <a:lstStyle/>
@@ -4683,17 +5178,58 @@
           </a:p>
         </p:txBody>
       </p:sp>
-      <p:sp>
-        <p:nvSpPr>
-          <p:cNvPr id="3" name="Title 2"/>
-          <p:cNvSpPr>
-            <a:spLocks noGrp="1"/>
-          </p:cNvSpPr>
-          <p:nvPr>
-            <p:ph type="title"/>
-          </p:nvPr>
-        </p:nvSpPr>
-        <p:spPr/>
+      <p:pic>
+        <p:nvPicPr>
+          <p:cNvPr id="6" name="Picture 5">
+            <a:extLst>
+              <a:ext uri="{FF2B5EF4-FFF2-40B4-BE49-F238E27FC236}">
+                <a16:creationId xmlns:a16="http://schemas.microsoft.com/office/drawing/2014/main" id="{70D0C587-00E2-B843-9EF6-45C4CBCB0243}"/>
+              </a:ext>
+            </a:extLst>
+          </p:cNvPr>
+          <p:cNvPicPr>
+            <a:picLocks noChangeAspect="1"/>
+          </p:cNvPicPr>
+          <p:nvPr/>
+        </p:nvPicPr>
+        <p:blipFill rotWithShape="1">
+          <a:blip r:embed="rId2"/>
+          <a:srcRect t="4419" r="-2" b="-2"/>
+          <a:stretch/>
+        </p:blipFill>
+        <p:spPr>
+          <a:xfrm>
+            <a:off x="250551" y="2346581"/>
+            <a:ext cx="3950878" cy="3644104"/>
+          </a:xfrm>
+          <a:prstGeom prst="rect">
+            <a:avLst/>
+          </a:prstGeom>
+          <a:noFill/>
+        </p:spPr>
+      </p:pic>
+      <p:sp>
+        <p:nvSpPr>
+          <p:cNvPr id="20" name="Text Placeholder 5">
+            <a:extLst>
+              <a:ext uri="{FF2B5EF4-FFF2-40B4-BE49-F238E27FC236}">
+                <a16:creationId xmlns:a16="http://schemas.microsoft.com/office/drawing/2014/main" id="{6B901857-EDD8-43DB-BCA0-4C8407CDC9BE}"/>
+              </a:ext>
+            </a:extLst>
+          </p:cNvPr>
+          <p:cNvSpPr>
+            <a:spLocks noGrp="1"/>
+          </p:cNvSpPr>
+          <p:nvPr>
+            <p:ph type="body" sz="quarter" idx="13"/>
+          </p:nvPr>
+        </p:nvSpPr>
+        <p:spPr>
+          <a:xfrm>
+            <a:off x="7095256" y="791391"/>
+            <a:ext cx="1591545" cy="257175"/>
+          </a:xfrm>
+        </p:spPr>
         <p:txBody>
           <a:bodyPr/>
           <a:lstStyle/>
@@ -4704,367 +5240,88 @@
       </p:sp>
       <p:sp>
         <p:nvSpPr>
-          <p:cNvPr id="4" name="Text Placeholder 3"/>
-          <p:cNvSpPr>
-            <a:spLocks noGrp="1"/>
-          </p:cNvSpPr>
-          <p:nvPr>
-            <p:ph type="body" sz="quarter" idx="10"/>
-          </p:nvPr>
-        </p:nvSpPr>
-        <p:spPr/>
-        <p:txBody>
-          <a:bodyPr/>
+          <p:cNvPr id="8" name="Right Arrow 7">
+            <a:extLst>
+              <a:ext uri="{FF2B5EF4-FFF2-40B4-BE49-F238E27FC236}">
+                <a16:creationId xmlns:a16="http://schemas.microsoft.com/office/drawing/2014/main" id="{6CF947D8-61F2-C643-8BDC-DD5029BF1D26}"/>
+              </a:ext>
+            </a:extLst>
+          </p:cNvPr>
+          <p:cNvSpPr/>
+          <p:nvPr/>
+        </p:nvSpPr>
+        <p:spPr>
+          <a:xfrm>
+            <a:off x="4201429" y="3869356"/>
+            <a:ext cx="741143" cy="558265"/>
+          </a:xfrm>
+          <a:prstGeom prst="rightArrow">
+            <a:avLst/>
+          </a:prstGeom>
+          <a:solidFill>
+            <a:schemeClr val="accent2"/>
+          </a:solidFill>
+          <a:ln>
+            <a:noFill/>
+          </a:ln>
+        </p:spPr>
+        <p:style>
+          <a:lnRef idx="1">
+            <a:schemeClr val="accent1"/>
+          </a:lnRef>
+          <a:fillRef idx="3">
+            <a:schemeClr val="accent1"/>
+          </a:fillRef>
+          <a:effectRef idx="2">
+            <a:schemeClr val="accent1"/>
+          </a:effectRef>
+          <a:fontRef idx="minor">
+            <a:schemeClr val="lt1"/>
+          </a:fontRef>
+        </p:style>
+        <p:txBody>
+          <a:bodyPr rtlCol="0" anchor="ctr"/>
           <a:lstStyle/>
           <a:p>
+            <a:pPr algn="ctr"/>
             <a:endParaRPr lang="en-US"/>
           </a:p>
         </p:txBody>
       </p:sp>
-      <p:sp>
-        <p:nvSpPr>
-          <p:cNvPr id="5" name="Picture Placeholder 4"/>
-          <p:cNvSpPr>
-            <a:spLocks noGrp="1"/>
-          </p:cNvSpPr>
-          <p:nvPr>
-            <p:ph type="pic" sz="quarter" idx="13"/>
-          </p:nvPr>
-        </p:nvSpPr>
-        <p:spPr/>
-      </p:sp>
-      <p:sp>
-        <p:nvSpPr>
-          <p:cNvPr id="6" name="Text Placeholder 5"/>
-          <p:cNvSpPr>
-            <a:spLocks noGrp="1"/>
-          </p:cNvSpPr>
-          <p:nvPr>
-            <p:ph type="body" sz="quarter" idx="14"/>
-          </p:nvPr>
-        </p:nvSpPr>
-        <p:spPr/>
-        <p:txBody>
-          <a:bodyPr/>
-          <a:lstStyle/>
-          <a:p>
-            <a:endParaRPr lang="en-US"/>
-          </a:p>
-        </p:txBody>
-      </p:sp>
-      <p:sp>
-        <p:nvSpPr>
-          <p:cNvPr id="7" name="Text Placeholder 6"/>
-          <p:cNvSpPr>
-            <a:spLocks noGrp="1"/>
-          </p:cNvSpPr>
-          <p:nvPr>
-            <p:ph type="body" sz="quarter" idx="12"/>
-          </p:nvPr>
-        </p:nvSpPr>
-        <p:spPr/>
-        <p:txBody>
-          <a:bodyPr/>
-          <a:lstStyle/>
-          <a:p>
-            <a:endParaRPr lang="en-US"/>
-          </a:p>
-        </p:txBody>
-      </p:sp>
+      <p:pic>
+        <p:nvPicPr>
+          <p:cNvPr id="9" name="Picture 8">
+            <a:extLst>
+              <a:ext uri="{FF2B5EF4-FFF2-40B4-BE49-F238E27FC236}">
+                <a16:creationId xmlns:a16="http://schemas.microsoft.com/office/drawing/2014/main" id="{C883061F-C4BC-B046-85E6-6592F4FF00CD}"/>
+              </a:ext>
+            </a:extLst>
+          </p:cNvPr>
+          <p:cNvPicPr>
+            <a:picLocks noChangeAspect="1"/>
+          </p:cNvPicPr>
+          <p:nvPr/>
+        </p:nvPicPr>
+        <p:blipFill>
+          <a:blip r:embed="rId3"/>
+          <a:stretch>
+            <a:fillRect/>
+          </a:stretch>
+        </p:blipFill>
+        <p:spPr>
+          <a:xfrm>
+            <a:off x="4942572" y="2046886"/>
+            <a:ext cx="3950878" cy="4203203"/>
+          </a:xfrm>
+          <a:prstGeom prst="rect">
+            <a:avLst/>
+          </a:prstGeom>
+        </p:spPr>
+      </p:pic>
     </p:spTree>
     <p:extLst>
       <p:ext uri="{BB962C8B-B14F-4D97-AF65-F5344CB8AC3E}">
-        <p14:creationId xmlns:p14="http://schemas.microsoft.com/office/powerpoint/2010/main" val="1548537219"/>
-      </p:ext>
-    </p:extLst>
-  </p:cSld>
-  <p:clrMapOvr>
-    <a:masterClrMapping/>
-  </p:clrMapOvr>
-</p:sld>
-</file>
-
-<file path=ppt/slides/slide7.xml><?xml version="1.0" encoding="utf-8"?>
-<p:sld xmlns:a="http://schemas.openxmlformats.org/drawingml/2006/main" xmlns:r="http://schemas.openxmlformats.org/officeDocument/2006/relationships" xmlns:p="http://schemas.openxmlformats.org/presentationml/2006/main">
-  <p:cSld>
-    <p:spTree>
-      <p:nvGrpSpPr>
-        <p:cNvPr id="1" name=""/>
-        <p:cNvGrpSpPr/>
-        <p:nvPr/>
-      </p:nvGrpSpPr>
-      <p:grpSpPr>
-        <a:xfrm>
-          <a:off x="0" y="0"/>
-          <a:ext cx="0" cy="0"/>
-          <a:chOff x="0" y="0"/>
-          <a:chExt cx="0" cy="0"/>
-        </a:xfrm>
-      </p:grpSpPr>
-      <p:sp>
-        <p:nvSpPr>
-          <p:cNvPr id="2" name="Text Placeholder 1"/>
-          <p:cNvSpPr>
-            <a:spLocks noGrp="1"/>
-          </p:cNvSpPr>
-          <p:nvPr>
-            <p:ph type="body" sz="quarter" idx="10"/>
-          </p:nvPr>
-        </p:nvSpPr>
-        <p:spPr/>
-        <p:txBody>
-          <a:bodyPr/>
-          <a:lstStyle/>
-          <a:p>
-            <a:endParaRPr lang="en-US"/>
-          </a:p>
-        </p:txBody>
-      </p:sp>
-      <p:sp>
-        <p:nvSpPr>
-          <p:cNvPr id="3" name="Picture Placeholder 2"/>
-          <p:cNvSpPr>
-            <a:spLocks noGrp="1"/>
-          </p:cNvSpPr>
-          <p:nvPr>
-            <p:ph type="pic" sz="quarter" idx="13"/>
-          </p:nvPr>
-        </p:nvSpPr>
-        <p:spPr/>
-      </p:sp>
-      <p:sp>
-        <p:nvSpPr>
-          <p:cNvPr id="4" name="Text Placeholder 3"/>
-          <p:cNvSpPr>
-            <a:spLocks noGrp="1"/>
-          </p:cNvSpPr>
-          <p:nvPr>
-            <p:ph type="body" sz="quarter" idx="14"/>
-          </p:nvPr>
-        </p:nvSpPr>
-        <p:spPr/>
-        <p:txBody>
-          <a:bodyPr/>
-          <a:lstStyle/>
-          <a:p>
-            <a:endParaRPr lang="en-US"/>
-          </a:p>
-        </p:txBody>
-      </p:sp>
-      <p:sp>
-        <p:nvSpPr>
-          <p:cNvPr id="5" name="Text Placeholder 4"/>
-          <p:cNvSpPr>
-            <a:spLocks noGrp="1"/>
-          </p:cNvSpPr>
-          <p:nvPr>
-            <p:ph type="body" sz="quarter" idx="12"/>
-          </p:nvPr>
-        </p:nvSpPr>
-        <p:spPr/>
-        <p:txBody>
-          <a:bodyPr/>
-          <a:lstStyle/>
-          <a:p>
-            <a:endParaRPr lang="en-US"/>
-          </a:p>
-        </p:txBody>
-      </p:sp>
-    </p:spTree>
-    <p:extLst>
-      <p:ext uri="{BB962C8B-B14F-4D97-AF65-F5344CB8AC3E}">
-        <p14:creationId xmlns:p14="http://schemas.microsoft.com/office/powerpoint/2010/main" val="1933405525"/>
-      </p:ext>
-    </p:extLst>
-  </p:cSld>
-  <p:clrMapOvr>
-    <a:masterClrMapping/>
-  </p:clrMapOvr>
-</p:sld>
-</file>
-
-<file path=ppt/slides/slide8.xml><?xml version="1.0" encoding="utf-8"?>
-<p:sld xmlns:a="http://schemas.openxmlformats.org/drawingml/2006/main" xmlns:r="http://schemas.openxmlformats.org/officeDocument/2006/relationships" xmlns:p="http://schemas.openxmlformats.org/presentationml/2006/main">
-  <p:cSld>
-    <p:spTree>
-      <p:nvGrpSpPr>
-        <p:cNvPr id="1" name=""/>
-        <p:cNvGrpSpPr/>
-        <p:nvPr/>
-      </p:nvGrpSpPr>
-      <p:grpSpPr>
-        <a:xfrm>
-          <a:off x="0" y="0"/>
-          <a:ext cx="0" cy="0"/>
-          <a:chOff x="0" y="0"/>
-          <a:chExt cx="0" cy="0"/>
-        </a:xfrm>
-      </p:grpSpPr>
-      <p:sp>
-        <p:nvSpPr>
-          <p:cNvPr id="2" name="Text Placeholder 1"/>
-          <p:cNvSpPr>
-            <a:spLocks noGrp="1"/>
-          </p:cNvSpPr>
-          <p:nvPr>
-            <p:ph type="body" sz="quarter" idx="10"/>
-          </p:nvPr>
-        </p:nvSpPr>
-        <p:spPr/>
-        <p:txBody>
-          <a:bodyPr/>
-          <a:lstStyle/>
-          <a:p>
-            <a:endParaRPr lang="en-US"/>
-          </a:p>
-        </p:txBody>
-      </p:sp>
-      <p:sp>
-        <p:nvSpPr>
-          <p:cNvPr id="3" name="Picture Placeholder 2"/>
-          <p:cNvSpPr>
-            <a:spLocks noGrp="1"/>
-          </p:cNvSpPr>
-          <p:nvPr>
-            <p:ph type="pic" sz="quarter" idx="13"/>
-          </p:nvPr>
-        </p:nvSpPr>
-        <p:spPr/>
-      </p:sp>
-      <p:sp>
-        <p:nvSpPr>
-          <p:cNvPr id="4" name="Text Placeholder 3"/>
-          <p:cNvSpPr>
-            <a:spLocks noGrp="1"/>
-          </p:cNvSpPr>
-          <p:nvPr>
-            <p:ph type="body" sz="quarter" idx="14"/>
-          </p:nvPr>
-        </p:nvSpPr>
-        <p:spPr/>
-        <p:txBody>
-          <a:bodyPr/>
-          <a:lstStyle/>
-          <a:p>
-            <a:endParaRPr lang="en-US"/>
-          </a:p>
-        </p:txBody>
-      </p:sp>
-      <p:sp>
-        <p:nvSpPr>
-          <p:cNvPr id="5" name="Picture Placeholder 4"/>
-          <p:cNvSpPr>
-            <a:spLocks noGrp="1"/>
-          </p:cNvSpPr>
-          <p:nvPr>
-            <p:ph type="pic" sz="quarter" idx="15"/>
-          </p:nvPr>
-        </p:nvSpPr>
-        <p:spPr/>
-      </p:sp>
-      <p:sp>
-        <p:nvSpPr>
-          <p:cNvPr id="6" name="Picture Placeholder 5"/>
-          <p:cNvSpPr>
-            <a:spLocks noGrp="1"/>
-          </p:cNvSpPr>
-          <p:nvPr>
-            <p:ph type="pic" sz="quarter" idx="16"/>
-          </p:nvPr>
-        </p:nvSpPr>
-        <p:spPr/>
-      </p:sp>
-      <p:sp>
-        <p:nvSpPr>
-          <p:cNvPr id="7" name="Text Placeholder 6"/>
-          <p:cNvSpPr>
-            <a:spLocks noGrp="1"/>
-          </p:cNvSpPr>
-          <p:nvPr>
-            <p:ph type="body" sz="quarter" idx="12"/>
-          </p:nvPr>
-        </p:nvSpPr>
-        <p:spPr/>
-        <p:txBody>
-          <a:bodyPr/>
-          <a:lstStyle/>
-          <a:p>
-            <a:endParaRPr lang="en-US"/>
-          </a:p>
-        </p:txBody>
-      </p:sp>
-    </p:spTree>
-    <p:extLst>
-      <p:ext uri="{BB962C8B-B14F-4D97-AF65-F5344CB8AC3E}">
-        <p14:creationId xmlns:p14="http://schemas.microsoft.com/office/powerpoint/2010/main" val="391101801"/>
-      </p:ext>
-    </p:extLst>
-  </p:cSld>
-  <p:clrMapOvr>
-    <a:masterClrMapping/>
-  </p:clrMapOvr>
-</p:sld>
-</file>
-
-<file path=ppt/slides/slide9.xml><?xml version="1.0" encoding="utf-8"?>
-<p:sld xmlns:a="http://schemas.openxmlformats.org/drawingml/2006/main" xmlns:r="http://schemas.openxmlformats.org/officeDocument/2006/relationships" xmlns:p="http://schemas.openxmlformats.org/presentationml/2006/main">
-  <p:cSld>
-    <p:spTree>
-      <p:nvGrpSpPr>
-        <p:cNvPr id="1" name=""/>
-        <p:cNvGrpSpPr/>
-        <p:nvPr/>
-      </p:nvGrpSpPr>
-      <p:grpSpPr>
-        <a:xfrm>
-          <a:off x="0" y="0"/>
-          <a:ext cx="0" cy="0"/>
-          <a:chOff x="0" y="0"/>
-          <a:chExt cx="0" cy="0"/>
-        </a:xfrm>
-      </p:grpSpPr>
-      <p:sp>
-        <p:nvSpPr>
-          <p:cNvPr id="2" name="Text Placeholder 1"/>
-          <p:cNvSpPr>
-            <a:spLocks noGrp="1"/>
-          </p:cNvSpPr>
-          <p:nvPr>
-            <p:ph type="body" sz="quarter" idx="10"/>
-          </p:nvPr>
-        </p:nvSpPr>
-        <p:spPr/>
-        <p:txBody>
-          <a:bodyPr/>
-          <a:lstStyle/>
-          <a:p>
-            <a:endParaRPr lang="en-US"/>
-          </a:p>
-        </p:txBody>
-      </p:sp>
-      <p:sp>
-        <p:nvSpPr>
-          <p:cNvPr id="3" name="Text Placeholder 2"/>
-          <p:cNvSpPr>
-            <a:spLocks noGrp="1"/>
-          </p:cNvSpPr>
-          <p:nvPr>
-            <p:ph type="body" sz="quarter" idx="12"/>
-          </p:nvPr>
-        </p:nvSpPr>
-        <p:spPr/>
-        <p:txBody>
-          <a:bodyPr/>
-          <a:lstStyle/>
-          <a:p>
-            <a:endParaRPr lang="en-US"/>
-          </a:p>
-        </p:txBody>
-      </p:sp>
-    </p:spTree>
-    <p:extLst>
-      <p:ext uri="{BB962C8B-B14F-4D97-AF65-F5344CB8AC3E}">
-        <p14:creationId xmlns:p14="http://schemas.microsoft.com/office/powerpoint/2010/main" val="2304087987"/>
+        <p14:creationId xmlns:p14="http://schemas.microsoft.com/office/powerpoint/2010/main" val="1563310146"/>
       </p:ext>
     </p:extLst>
   </p:cSld>

</xml_diff>

<commit_message>
doc: adding utilities for the powerpoint
</commit_message>
<xml_diff>
--- a/doc/Group 02.pptx
+++ b/doc/Group 02.pptx
@@ -5,18 +5,23 @@
     <p:sldMasterId id="2147483648" r:id="rId1"/>
   </p:sldMasterIdLst>
   <p:notesMasterIdLst>
-    <p:notesMasterId r:id="rId8"/>
+    <p:notesMasterId r:id="rId13"/>
   </p:notesMasterIdLst>
   <p:handoutMasterIdLst>
-    <p:handoutMasterId r:id="rId9"/>
+    <p:handoutMasterId r:id="rId14"/>
   </p:handoutMasterIdLst>
   <p:sldIdLst>
     <p:sldId id="256" r:id="rId2"/>
     <p:sldId id="257" r:id="rId3"/>
     <p:sldId id="258" r:id="rId4"/>
-    <p:sldId id="259" r:id="rId5"/>
-    <p:sldId id="261" r:id="rId6"/>
-    <p:sldId id="260" r:id="rId7"/>
+    <p:sldId id="261" r:id="rId5"/>
+    <p:sldId id="260" r:id="rId6"/>
+    <p:sldId id="262" r:id="rId7"/>
+    <p:sldId id="263" r:id="rId8"/>
+    <p:sldId id="264" r:id="rId9"/>
+    <p:sldId id="265" r:id="rId10"/>
+    <p:sldId id="266" r:id="rId11"/>
+    <p:sldId id="267" r:id="rId12"/>
   </p:sldIdLst>
   <p:sldSz cx="9144000" cy="6858000" type="screen4x3"/>
   <p:notesSz cx="6858000" cy="9144000"/>
@@ -127,9 +132,18 @@
           <p14:sldIdLst>
             <p14:sldId id="257"/>
             <p14:sldId id="258"/>
-            <p14:sldId id="259"/>
             <p14:sldId id="261"/>
             <p14:sldId id="260"/>
+            <p14:sldId id="262"/>
+          </p14:sldIdLst>
+        </p14:section>
+        <p14:section name="Assembler" id="{C9E0E156-5657-CC43-94C6-B918887093C4}">
+          <p14:sldIdLst>
+            <p14:sldId id="263"/>
+            <p14:sldId id="264"/>
+            <p14:sldId id="265"/>
+            <p14:sldId id="266"/>
+            <p14:sldId id="267"/>
           </p14:sldIdLst>
         </p14:section>
       </p14:sectionLst>
@@ -169,7 +183,7 @@
 <file path=ppt/revisionInfo.xml><?xml version="1.0" encoding="utf-8"?>
 <p1510:revInfo xmlns:a="http://schemas.openxmlformats.org/drawingml/2006/main" xmlns:r="http://schemas.openxmlformats.org/officeDocument/2006/relationships" xmlns:p1510="http://schemas.microsoft.com/office/powerpoint/2015/10/main">
   <p1510:revLst>
-    <p1510:client id="{900BBACA-0FF8-6442-96A4-6DBD3920C5BD}" v="12" dt="2021-06-14T15:10:30.956"/>
+    <p1510:client id="{900BBACA-0FF8-6442-96A4-6DBD3920C5BD}" v="19" dt="2021-06-14T15:25:35.572"/>
   </p1510:revLst>
 </p1510:revInfo>
 </file>
@@ -179,7 +193,7 @@
   <pc:docChgLst>
     <pc:chgData name="Singh, Siddhant" userId="a6f2eba6-d5ab-4fbd-825a-0fa7d1537616" providerId="ADAL" clId="{900BBACA-0FF8-6442-96A4-6DBD3920C5BD}"/>
     <pc:docChg chg="undo custSel addSld delSld modSld addSection delSection modSection">
-      <pc:chgData name="Singh, Siddhant" userId="a6f2eba6-d5ab-4fbd-825a-0fa7d1537616" providerId="ADAL" clId="{900BBACA-0FF8-6442-96A4-6DBD3920C5BD}" dt="2021-06-14T15:12:00.890" v="619" actId="20577"/>
+      <pc:chgData name="Singh, Siddhant" userId="a6f2eba6-d5ab-4fbd-825a-0fa7d1537616" providerId="ADAL" clId="{900BBACA-0FF8-6442-96A4-6DBD3920C5BD}" dt="2021-06-14T15:25:53.999" v="1051" actId="1076"/>
       <pc:docMkLst>
         <pc:docMk/>
       </pc:docMkLst>
@@ -355,13 +369,13 @@
         </pc:sldMkLst>
       </pc:sldChg>
       <pc:sldChg chg="addSp delSp modSp new mod modAnim">
-        <pc:chgData name="Singh, Siddhant" userId="a6f2eba6-d5ab-4fbd-825a-0fa7d1537616" providerId="ADAL" clId="{900BBACA-0FF8-6442-96A4-6DBD3920C5BD}" dt="2021-06-14T15:09:01.971" v="608" actId="1076"/>
+        <pc:chgData name="Singh, Siddhant" userId="a6f2eba6-d5ab-4fbd-825a-0fa7d1537616" providerId="ADAL" clId="{900BBACA-0FF8-6442-96A4-6DBD3920C5BD}" dt="2021-06-14T15:15:46.731" v="698" actId="20577"/>
         <pc:sldMkLst>
           <pc:docMk/>
           <pc:sldMk cId="4254132451" sldId="258"/>
         </pc:sldMkLst>
         <pc:spChg chg="mod">
-          <ac:chgData name="Singh, Siddhant" userId="a6f2eba6-d5ab-4fbd-825a-0fa7d1537616" providerId="ADAL" clId="{900BBACA-0FF8-6442-96A4-6DBD3920C5BD}" dt="2021-06-14T14:57:13.952" v="441" actId="20577"/>
+          <ac:chgData name="Singh, Siddhant" userId="a6f2eba6-d5ab-4fbd-825a-0fa7d1537616" providerId="ADAL" clId="{900BBACA-0FF8-6442-96A4-6DBD3920C5BD}" dt="2021-06-14T15:15:46.731" v="698" actId="20577"/>
           <ac:spMkLst>
             <pc:docMk/>
             <pc:sldMk cId="4254132451" sldId="258"/>
@@ -392,8 +406,8 @@
           <pc:sldMk cId="94465279" sldId="259"/>
         </pc:sldMkLst>
       </pc:sldChg>
-      <pc:sldChg chg="modSp new mod">
-        <pc:chgData name="Singh, Siddhant" userId="a6f2eba6-d5ab-4fbd-825a-0fa7d1537616" providerId="ADAL" clId="{900BBACA-0FF8-6442-96A4-6DBD3920C5BD}" dt="2021-06-14T15:06:36.080" v="531" actId="20577"/>
+      <pc:sldChg chg="modSp new del mod">
+        <pc:chgData name="Singh, Siddhant" userId="a6f2eba6-d5ab-4fbd-825a-0fa7d1537616" providerId="ADAL" clId="{900BBACA-0FF8-6442-96A4-6DBD3920C5BD}" dt="2021-06-14T15:21:05.289" v="915" actId="2696"/>
         <pc:sldMkLst>
           <pc:docMk/>
           <pc:sldMk cId="2890495124" sldId="259"/>
@@ -540,17 +554,32 @@
         </pc:sldMkLst>
       </pc:sldChg>
       <pc:sldChg chg="modSp add mod">
-        <pc:chgData name="Singh, Siddhant" userId="a6f2eba6-d5ab-4fbd-825a-0fa7d1537616" providerId="ADAL" clId="{900BBACA-0FF8-6442-96A4-6DBD3920C5BD}" dt="2021-06-14T15:12:00.890" v="619" actId="20577"/>
+        <pc:chgData name="Singh, Siddhant" userId="a6f2eba6-d5ab-4fbd-825a-0fa7d1537616" providerId="ADAL" clId="{900BBACA-0FF8-6442-96A4-6DBD3920C5BD}" dt="2021-06-14T15:20:36.495" v="880" actId="20577"/>
         <pc:sldMkLst>
           <pc:docMk/>
           <pc:sldMk cId="2051625864" sldId="261"/>
         </pc:sldMkLst>
         <pc:spChg chg="mod">
-          <ac:chgData name="Singh, Siddhant" userId="a6f2eba6-d5ab-4fbd-825a-0fa7d1537616" providerId="ADAL" clId="{900BBACA-0FF8-6442-96A4-6DBD3920C5BD}" dt="2021-06-14T15:12:00.890" v="619" actId="20577"/>
+          <ac:chgData name="Singh, Siddhant" userId="a6f2eba6-d5ab-4fbd-825a-0fa7d1537616" providerId="ADAL" clId="{900BBACA-0FF8-6442-96A4-6DBD3920C5BD}" dt="2021-06-14T15:20:36.495" v="880" actId="20577"/>
           <ac:spMkLst>
             <pc:docMk/>
             <pc:sldMk cId="2051625864" sldId="261"/>
             <ac:spMk id="2" creationId="{43816B38-A43F-D040-95A5-7F3ADC6BCBF0}"/>
+          </ac:spMkLst>
+        </pc:spChg>
+      </pc:sldChg>
+      <pc:sldChg chg="modSp new mod">
+        <pc:chgData name="Singh, Siddhant" userId="a6f2eba6-d5ab-4fbd-825a-0fa7d1537616" providerId="ADAL" clId="{900BBACA-0FF8-6442-96A4-6DBD3920C5BD}" dt="2021-06-14T15:13:21.379" v="664" actId="20577"/>
+        <pc:sldMkLst>
+          <pc:docMk/>
+          <pc:sldMk cId="853756472" sldId="262"/>
+        </pc:sldMkLst>
+        <pc:spChg chg="mod">
+          <ac:chgData name="Singh, Siddhant" userId="a6f2eba6-d5ab-4fbd-825a-0fa7d1537616" providerId="ADAL" clId="{900BBACA-0FF8-6442-96A4-6DBD3920C5BD}" dt="2021-06-14T15:13:21.379" v="664" actId="20577"/>
+          <ac:spMkLst>
+            <pc:docMk/>
+            <pc:sldMk cId="853756472" sldId="262"/>
+            <ac:spMk id="2" creationId="{D9A37852-13F1-4840-9394-A377E8B7A755}"/>
           </ac:spMkLst>
         </pc:spChg>
       </pc:sldChg>
@@ -561,6 +590,13 @@
           <pc:sldMk cId="1933405525" sldId="262"/>
         </pc:sldMkLst>
       </pc:sldChg>
+      <pc:sldChg chg="add del">
+        <pc:chgData name="Singh, Siddhant" userId="a6f2eba6-d5ab-4fbd-825a-0fa7d1537616" providerId="ADAL" clId="{900BBACA-0FF8-6442-96A4-6DBD3920C5BD}" dt="2021-06-14T15:13:09.381" v="621" actId="2696"/>
+        <pc:sldMkLst>
+          <pc:docMk/>
+          <pc:sldMk cId="4067271476" sldId="262"/>
+        </pc:sldMkLst>
+      </pc:sldChg>
       <pc:sldChg chg="del">
         <pc:chgData name="Singh, Siddhant" userId="a6f2eba6-d5ab-4fbd-825a-0fa7d1537616" providerId="ADAL" clId="{900BBACA-0FF8-6442-96A4-6DBD3920C5BD}" dt="2021-06-14T14:49:05.388" v="338" actId="2696"/>
         <pc:sldMkLst>
@@ -568,12 +604,287 @@
           <pc:sldMk cId="391101801" sldId="263"/>
         </pc:sldMkLst>
       </pc:sldChg>
+      <pc:sldChg chg="modSp add mod">
+        <pc:chgData name="Singh, Siddhant" userId="a6f2eba6-d5ab-4fbd-825a-0fa7d1537616" providerId="ADAL" clId="{900BBACA-0FF8-6442-96A4-6DBD3920C5BD}" dt="2021-06-14T15:15:33.047" v="688" actId="1076"/>
+        <pc:sldMkLst>
+          <pc:docMk/>
+          <pc:sldMk cId="3735791374" sldId="263"/>
+        </pc:sldMkLst>
+        <pc:spChg chg="mod">
+          <ac:chgData name="Singh, Siddhant" userId="a6f2eba6-d5ab-4fbd-825a-0fa7d1537616" providerId="ADAL" clId="{900BBACA-0FF8-6442-96A4-6DBD3920C5BD}" dt="2021-06-14T15:15:33.047" v="688" actId="1076"/>
+          <ac:spMkLst>
+            <pc:docMk/>
+            <pc:sldMk cId="3735791374" sldId="263"/>
+            <ac:spMk id="3" creationId="{3555113C-CF6F-B449-B275-E4F07B5D17ED}"/>
+          </ac:spMkLst>
+        </pc:spChg>
+      </pc:sldChg>
       <pc:sldChg chg="del">
         <pc:chgData name="Singh, Siddhant" userId="a6f2eba6-d5ab-4fbd-825a-0fa7d1537616" providerId="ADAL" clId="{900BBACA-0FF8-6442-96A4-6DBD3920C5BD}" dt="2021-06-14T14:49:05.388" v="338" actId="2696"/>
         <pc:sldMkLst>
           <pc:docMk/>
           <pc:sldMk cId="2304087987" sldId="264"/>
         </pc:sldMkLst>
+      </pc:sldChg>
+      <pc:sldChg chg="modSp add mod">
+        <pc:chgData name="Singh, Siddhant" userId="a6f2eba6-d5ab-4fbd-825a-0fa7d1537616" providerId="ADAL" clId="{900BBACA-0FF8-6442-96A4-6DBD3920C5BD}" dt="2021-06-14T15:15:52.858" v="710" actId="20577"/>
+        <pc:sldMkLst>
+          <pc:docMk/>
+          <pc:sldMk cId="3656303320" sldId="264"/>
+        </pc:sldMkLst>
+        <pc:spChg chg="mod">
+          <ac:chgData name="Singh, Siddhant" userId="a6f2eba6-d5ab-4fbd-825a-0fa7d1537616" providerId="ADAL" clId="{900BBACA-0FF8-6442-96A4-6DBD3920C5BD}" dt="2021-06-14T15:15:52.858" v="710" actId="20577"/>
+          <ac:spMkLst>
+            <pc:docMk/>
+            <pc:sldMk cId="3656303320" sldId="264"/>
+            <ac:spMk id="2" creationId="{025DBAA8-8B8F-2C4D-9528-35022154E179}"/>
+          </ac:spMkLst>
+        </pc:spChg>
+      </pc:sldChg>
+      <pc:sldChg chg="addSp delSp modSp new mod modClrScheme chgLayout">
+        <pc:chgData name="Singh, Siddhant" userId="a6f2eba6-d5ab-4fbd-825a-0fa7d1537616" providerId="ADAL" clId="{900BBACA-0FF8-6442-96A4-6DBD3920C5BD}" dt="2021-06-14T15:23:08.268" v="1016" actId="478"/>
+        <pc:sldMkLst>
+          <pc:docMk/>
+          <pc:sldMk cId="722765808" sldId="265"/>
+        </pc:sldMkLst>
+        <pc:spChg chg="mod ord">
+          <ac:chgData name="Singh, Siddhant" userId="a6f2eba6-d5ab-4fbd-825a-0fa7d1537616" providerId="ADAL" clId="{900BBACA-0FF8-6442-96A4-6DBD3920C5BD}" dt="2021-06-14T15:23:05.898" v="1015" actId="26606"/>
+          <ac:spMkLst>
+            <pc:docMk/>
+            <pc:sldMk cId="722765808" sldId="265"/>
+            <ac:spMk id="2" creationId="{2C755187-C2E4-384E-ADFB-64FE487567F7}"/>
+          </ac:spMkLst>
+        </pc:spChg>
+        <pc:spChg chg="del">
+          <ac:chgData name="Singh, Siddhant" userId="a6f2eba6-d5ab-4fbd-825a-0fa7d1537616" providerId="ADAL" clId="{900BBACA-0FF8-6442-96A4-6DBD3920C5BD}" dt="2021-06-14T15:22:44.841" v="1012"/>
+          <ac:spMkLst>
+            <pc:docMk/>
+            <pc:sldMk cId="722765808" sldId="265"/>
+            <ac:spMk id="3" creationId="{B3FA6F18-5A4B-EE47-95ED-4F45DA274CCB}"/>
+          </ac:spMkLst>
+        </pc:spChg>
+        <pc:spChg chg="del">
+          <ac:chgData name="Singh, Siddhant" userId="a6f2eba6-d5ab-4fbd-825a-0fa7d1537616" providerId="ADAL" clId="{900BBACA-0FF8-6442-96A4-6DBD3920C5BD}" dt="2021-06-14T15:23:05.898" v="1015" actId="26606"/>
+          <ac:spMkLst>
+            <pc:docMk/>
+            <pc:sldMk cId="722765808" sldId="265"/>
+            <ac:spMk id="4" creationId="{80115394-D6D8-AA41-9BB6-5569A4E4025D}"/>
+          </ac:spMkLst>
+        </pc:spChg>
+        <pc:spChg chg="del">
+          <ac:chgData name="Singh, Siddhant" userId="a6f2eba6-d5ab-4fbd-825a-0fa7d1537616" providerId="ADAL" clId="{900BBACA-0FF8-6442-96A4-6DBD3920C5BD}" dt="2021-06-14T15:23:05.898" v="1015" actId="26606"/>
+          <ac:spMkLst>
+            <pc:docMk/>
+            <pc:sldMk cId="722765808" sldId="265"/>
+            <ac:spMk id="5" creationId="{78396EC6-217B-3E48-B45A-CC67AB5DEBF0}"/>
+          </ac:spMkLst>
+        </pc:spChg>
+        <pc:spChg chg="add del mod">
+          <ac:chgData name="Singh, Siddhant" userId="a6f2eba6-d5ab-4fbd-825a-0fa7d1537616" providerId="ADAL" clId="{900BBACA-0FF8-6442-96A4-6DBD3920C5BD}" dt="2021-06-14T15:22:52.507" v="1014"/>
+          <ac:spMkLst>
+            <pc:docMk/>
+            <pc:sldMk cId="722765808" sldId="265"/>
+            <ac:spMk id="8" creationId="{B5EEA0F2-6DB8-7B43-AAAB-C1CDAAD59155}"/>
+          </ac:spMkLst>
+        </pc:spChg>
+        <pc:spChg chg="add mod">
+          <ac:chgData name="Singh, Siddhant" userId="a6f2eba6-d5ab-4fbd-825a-0fa7d1537616" providerId="ADAL" clId="{900BBACA-0FF8-6442-96A4-6DBD3920C5BD}" dt="2021-06-14T15:23:08.268" v="1016" actId="478"/>
+          <ac:spMkLst>
+            <pc:docMk/>
+            <pc:sldMk cId="722765808" sldId="265"/>
+            <ac:spMk id="11" creationId="{522350D3-9514-E046-913E-AC03B2D7AC57}"/>
+          </ac:spMkLst>
+        </pc:spChg>
+        <pc:spChg chg="add mod">
+          <ac:chgData name="Singh, Siddhant" userId="a6f2eba6-d5ab-4fbd-825a-0fa7d1537616" providerId="ADAL" clId="{900BBACA-0FF8-6442-96A4-6DBD3920C5BD}" dt="2021-06-14T15:23:05.898" v="1015" actId="26606"/>
+          <ac:spMkLst>
+            <pc:docMk/>
+            <pc:sldMk cId="722765808" sldId="265"/>
+            <ac:spMk id="14" creationId="{42F2FA1B-1A14-48A0-BAFC-4DC0A925C20B}"/>
+          </ac:spMkLst>
+        </pc:spChg>
+        <pc:spChg chg="add mod">
+          <ac:chgData name="Singh, Siddhant" userId="a6f2eba6-d5ab-4fbd-825a-0fa7d1537616" providerId="ADAL" clId="{900BBACA-0FF8-6442-96A4-6DBD3920C5BD}" dt="2021-06-14T15:23:05.898" v="1015" actId="26606"/>
+          <ac:spMkLst>
+            <pc:docMk/>
+            <pc:sldMk cId="722765808" sldId="265"/>
+            <ac:spMk id="16" creationId="{DCA2AB2A-6783-41E4-8898-9D9DB6284887}"/>
+          </ac:spMkLst>
+        </pc:spChg>
+        <pc:spChg chg="add mod">
+          <ac:chgData name="Singh, Siddhant" userId="a6f2eba6-d5ab-4fbd-825a-0fa7d1537616" providerId="ADAL" clId="{900BBACA-0FF8-6442-96A4-6DBD3920C5BD}" dt="2021-06-14T15:23:05.898" v="1015" actId="26606"/>
+          <ac:spMkLst>
+            <pc:docMk/>
+            <pc:sldMk cId="722765808" sldId="265"/>
+            <ac:spMk id="18" creationId="{B8C54E03-BD18-4B02-B3B2-53BB35BBBCE7}"/>
+          </ac:spMkLst>
+        </pc:spChg>
+        <pc:picChg chg="add del mod">
+          <ac:chgData name="Singh, Siddhant" userId="a6f2eba6-d5ab-4fbd-825a-0fa7d1537616" providerId="ADAL" clId="{900BBACA-0FF8-6442-96A4-6DBD3920C5BD}" dt="2021-06-14T15:22:49.461" v="1013" actId="478"/>
+          <ac:picMkLst>
+            <pc:docMk/>
+            <pc:sldMk cId="722765808" sldId="265"/>
+            <ac:picMk id="6" creationId="{8CC18AA0-FE4E-5A4E-A938-214CF45121F6}"/>
+          </ac:picMkLst>
+        </pc:picChg>
+        <pc:picChg chg="add del mod">
+          <ac:chgData name="Singh, Siddhant" userId="a6f2eba6-d5ab-4fbd-825a-0fa7d1537616" providerId="ADAL" clId="{900BBACA-0FF8-6442-96A4-6DBD3920C5BD}" dt="2021-06-14T15:23:08.268" v="1016" actId="478"/>
+          <ac:picMkLst>
+            <pc:docMk/>
+            <pc:sldMk cId="722765808" sldId="265"/>
+            <ac:picMk id="9" creationId="{DD1FC5F9-AF96-0E43-9115-C9926555A66A}"/>
+          </ac:picMkLst>
+        </pc:picChg>
+      </pc:sldChg>
+      <pc:sldChg chg="modSp new mod">
+        <pc:chgData name="Singh, Siddhant" userId="a6f2eba6-d5ab-4fbd-825a-0fa7d1537616" providerId="ADAL" clId="{900BBACA-0FF8-6442-96A4-6DBD3920C5BD}" dt="2021-06-14T15:22:06.858" v="1011" actId="20577"/>
+        <pc:sldMkLst>
+          <pc:docMk/>
+          <pc:sldMk cId="904256197" sldId="266"/>
+        </pc:sldMkLst>
+        <pc:spChg chg="mod">
+          <ac:chgData name="Singh, Siddhant" userId="a6f2eba6-d5ab-4fbd-825a-0fa7d1537616" providerId="ADAL" clId="{900BBACA-0FF8-6442-96A4-6DBD3920C5BD}" dt="2021-06-14T15:21:40.171" v="951" actId="2711"/>
+          <ac:spMkLst>
+            <pc:docMk/>
+            <pc:sldMk cId="904256197" sldId="266"/>
+            <ac:spMk id="2" creationId="{37D572D4-6CED-9742-B528-2E34F57E17CD}"/>
+          </ac:spMkLst>
+        </pc:spChg>
+        <pc:spChg chg="mod">
+          <ac:chgData name="Singh, Siddhant" userId="a6f2eba6-d5ab-4fbd-825a-0fa7d1537616" providerId="ADAL" clId="{900BBACA-0FF8-6442-96A4-6DBD3920C5BD}" dt="2021-06-14T15:22:06.858" v="1011" actId="20577"/>
+          <ac:spMkLst>
+            <pc:docMk/>
+            <pc:sldMk cId="904256197" sldId="266"/>
+            <ac:spMk id="3" creationId="{1A5C0668-093D-B446-AC39-396688B48669}"/>
+          </ac:spMkLst>
+        </pc:spChg>
+      </pc:sldChg>
+      <pc:sldChg chg="addSp delSp modSp new mod modClrScheme chgLayout">
+        <pc:chgData name="Singh, Siddhant" userId="a6f2eba6-d5ab-4fbd-825a-0fa7d1537616" providerId="ADAL" clId="{900BBACA-0FF8-6442-96A4-6DBD3920C5BD}" dt="2021-06-14T15:25:53.999" v="1051" actId="1076"/>
+        <pc:sldMkLst>
+          <pc:docMk/>
+          <pc:sldMk cId="1128959539" sldId="267"/>
+        </pc:sldMkLst>
+        <pc:spChg chg="add del mod">
+          <ac:chgData name="Singh, Siddhant" userId="a6f2eba6-d5ab-4fbd-825a-0fa7d1537616" providerId="ADAL" clId="{900BBACA-0FF8-6442-96A4-6DBD3920C5BD}" dt="2021-06-14T15:24:17.564" v="1025" actId="26606"/>
+          <ac:spMkLst>
+            <pc:docMk/>
+            <pc:sldMk cId="1128959539" sldId="267"/>
+            <ac:spMk id="2" creationId="{F20D9E84-D9D7-0649-98D4-ECAFA212DA48}"/>
+          </ac:spMkLst>
+        </pc:spChg>
+        <pc:spChg chg="del">
+          <ac:chgData name="Singh, Siddhant" userId="a6f2eba6-d5ab-4fbd-825a-0fa7d1537616" providerId="ADAL" clId="{900BBACA-0FF8-6442-96A4-6DBD3920C5BD}" dt="2021-06-14T15:24:04.046" v="1020"/>
+          <ac:spMkLst>
+            <pc:docMk/>
+            <pc:sldMk cId="1128959539" sldId="267"/>
+            <ac:spMk id="3" creationId="{0378B334-D6E9-E849-AA23-BBCB1BA09472}"/>
+          </ac:spMkLst>
+        </pc:spChg>
+        <pc:spChg chg="add del">
+          <ac:chgData name="Singh, Siddhant" userId="a6f2eba6-d5ab-4fbd-825a-0fa7d1537616" providerId="ADAL" clId="{900BBACA-0FF8-6442-96A4-6DBD3920C5BD}" dt="2021-06-14T15:24:17.564" v="1025" actId="26606"/>
+          <ac:spMkLst>
+            <pc:docMk/>
+            <pc:sldMk cId="1128959539" sldId="267"/>
+            <ac:spMk id="4" creationId="{C13DC623-B86C-2B4F-A585-B4C44277C7B6}"/>
+          </ac:spMkLst>
+        </pc:spChg>
+        <pc:spChg chg="add del">
+          <ac:chgData name="Singh, Siddhant" userId="a6f2eba6-d5ab-4fbd-825a-0fa7d1537616" providerId="ADAL" clId="{900BBACA-0FF8-6442-96A4-6DBD3920C5BD}" dt="2021-06-14T15:24:17.564" v="1025" actId="26606"/>
+          <ac:spMkLst>
+            <pc:docMk/>
+            <pc:sldMk cId="1128959539" sldId="267"/>
+            <ac:spMk id="5" creationId="{74D86D4C-5EBC-A74B-B40A-E4CCA8CA253E}"/>
+          </ac:spMkLst>
+        </pc:spChg>
+        <pc:spChg chg="add del mod">
+          <ac:chgData name="Singh, Siddhant" userId="a6f2eba6-d5ab-4fbd-825a-0fa7d1537616" providerId="ADAL" clId="{900BBACA-0FF8-6442-96A4-6DBD3920C5BD}" dt="2021-06-14T15:25:35.572" v="1046"/>
+          <ac:spMkLst>
+            <pc:docMk/>
+            <pc:sldMk cId="1128959539" sldId="267"/>
+            <ac:spMk id="9" creationId="{D5090041-9061-7548-B7F4-FF90B80D498A}"/>
+          </ac:spMkLst>
+        </pc:spChg>
+        <pc:spChg chg="add del mod">
+          <ac:chgData name="Singh, Siddhant" userId="a6f2eba6-d5ab-4fbd-825a-0fa7d1537616" providerId="ADAL" clId="{900BBACA-0FF8-6442-96A4-6DBD3920C5BD}" dt="2021-06-14T15:24:17.559" v="1024" actId="26606"/>
+          <ac:spMkLst>
+            <pc:docMk/>
+            <pc:sldMk cId="1128959539" sldId="267"/>
+            <ac:spMk id="12" creationId="{5788F3FC-FAA8-4967-B3D0-D93EF7B5C817}"/>
+          </ac:spMkLst>
+        </pc:spChg>
+        <pc:spChg chg="add del mod">
+          <ac:chgData name="Singh, Siddhant" userId="a6f2eba6-d5ab-4fbd-825a-0fa7d1537616" providerId="ADAL" clId="{900BBACA-0FF8-6442-96A4-6DBD3920C5BD}" dt="2021-06-14T15:24:17.559" v="1024" actId="26606"/>
+          <ac:spMkLst>
+            <pc:docMk/>
+            <pc:sldMk cId="1128959539" sldId="267"/>
+            <ac:spMk id="14" creationId="{AFFBB4D3-B714-4EA6-B9D8-CD4151CFFA9F}"/>
+          </ac:spMkLst>
+        </pc:spChg>
+        <pc:spChg chg="add del mod">
+          <ac:chgData name="Singh, Siddhant" userId="a6f2eba6-d5ab-4fbd-825a-0fa7d1537616" providerId="ADAL" clId="{900BBACA-0FF8-6442-96A4-6DBD3920C5BD}" dt="2021-06-14T15:24:17.559" v="1024" actId="26606"/>
+          <ac:spMkLst>
+            <pc:docMk/>
+            <pc:sldMk cId="1128959539" sldId="267"/>
+            <ac:spMk id="16" creationId="{3CA924CC-5EBC-4186-8F59-EF1D1B7E8306}"/>
+          </ac:spMkLst>
+        </pc:spChg>
+        <pc:spChg chg="add mod">
+          <ac:chgData name="Singh, Siddhant" userId="a6f2eba6-d5ab-4fbd-825a-0fa7d1537616" providerId="ADAL" clId="{900BBACA-0FF8-6442-96A4-6DBD3920C5BD}" dt="2021-06-14T15:25:39.293" v="1049" actId="26606"/>
+          <ac:spMkLst>
+            <pc:docMk/>
+            <pc:sldMk cId="1128959539" sldId="267"/>
+            <ac:spMk id="18" creationId="{945957EF-ECD6-466F-9AF1-DE30DE291B11}"/>
+          </ac:spMkLst>
+        </pc:spChg>
+        <pc:spChg chg="add del">
+          <ac:chgData name="Singh, Siddhant" userId="a6f2eba6-d5ab-4fbd-825a-0fa7d1537616" providerId="ADAL" clId="{900BBACA-0FF8-6442-96A4-6DBD3920C5BD}" dt="2021-06-14T15:25:39.293" v="1049" actId="26606"/>
+          <ac:spMkLst>
+            <pc:docMk/>
+            <pc:sldMk cId="1128959539" sldId="267"/>
+            <ac:spMk id="19" creationId="{06140793-0978-4BEB-BDE0-9F81E6BFCEE2}"/>
+          </ac:spMkLst>
+        </pc:spChg>
+        <pc:spChg chg="add del">
+          <ac:chgData name="Singh, Siddhant" userId="a6f2eba6-d5ab-4fbd-825a-0fa7d1537616" providerId="ADAL" clId="{900BBACA-0FF8-6442-96A4-6DBD3920C5BD}" dt="2021-06-14T15:25:39.293" v="1049" actId="26606"/>
+          <ac:spMkLst>
+            <pc:docMk/>
+            <pc:sldMk cId="1128959539" sldId="267"/>
+            <ac:spMk id="20" creationId="{96C605C1-45E7-4AE2-802D-648BA99DAC7F}"/>
+          </ac:spMkLst>
+        </pc:spChg>
+        <pc:spChg chg="add">
+          <ac:chgData name="Singh, Siddhant" userId="a6f2eba6-d5ab-4fbd-825a-0fa7d1537616" providerId="ADAL" clId="{900BBACA-0FF8-6442-96A4-6DBD3920C5BD}" dt="2021-06-14T15:25:39.293" v="1049" actId="26606"/>
+          <ac:spMkLst>
+            <pc:docMk/>
+            <pc:sldMk cId="1128959539" sldId="267"/>
+            <ac:spMk id="25" creationId="{9129DD14-57A8-4CD8-BF5A-0B04F34B3B2D}"/>
+          </ac:spMkLst>
+        </pc:spChg>
+        <pc:spChg chg="add">
+          <ac:chgData name="Singh, Siddhant" userId="a6f2eba6-d5ab-4fbd-825a-0fa7d1537616" providerId="ADAL" clId="{900BBACA-0FF8-6442-96A4-6DBD3920C5BD}" dt="2021-06-14T15:25:39.293" v="1049" actId="26606"/>
+          <ac:spMkLst>
+            <pc:docMk/>
+            <pc:sldMk cId="1128959539" sldId="267"/>
+            <ac:spMk id="27" creationId="{50648A06-AA9D-401E-9A35-F8A7124DBB01}"/>
+          </ac:spMkLst>
+        </pc:spChg>
+        <pc:picChg chg="add del mod">
+          <ac:chgData name="Singh, Siddhant" userId="a6f2eba6-d5ab-4fbd-825a-0fa7d1537616" providerId="ADAL" clId="{900BBACA-0FF8-6442-96A4-6DBD3920C5BD}" dt="2021-06-14T15:25:32.269" v="1045" actId="478"/>
+          <ac:picMkLst>
+            <pc:docMk/>
+            <pc:sldMk cId="1128959539" sldId="267"/>
+            <ac:picMk id="7" creationId="{01697A5A-935F-A54B-8E92-EB7EED42287E}"/>
+          </ac:picMkLst>
+        </pc:picChg>
+        <pc:picChg chg="add mod">
+          <ac:chgData name="Singh, Siddhant" userId="a6f2eba6-d5ab-4fbd-825a-0fa7d1537616" providerId="ADAL" clId="{900BBACA-0FF8-6442-96A4-6DBD3920C5BD}" dt="2021-06-14T15:25:53.999" v="1051" actId="1076"/>
+          <ac:picMkLst>
+            <pc:docMk/>
+            <pc:sldMk cId="1128959539" sldId="267"/>
+            <ac:picMk id="11" creationId="{78885A31-4BC7-DF48-BC64-D98658FBE0ED}"/>
+          </ac:picMkLst>
+        </pc:picChg>
       </pc:sldChg>
     </pc:docChg>
   </pc:docChgLst>
@@ -4458,6 +4769,304 @@
 </p:sld>
 </file>
 
+<file path=ppt/slides/slide10.xml><?xml version="1.0" encoding="utf-8"?>
+<p:sld xmlns:a="http://schemas.openxmlformats.org/drawingml/2006/main" xmlns:r="http://schemas.openxmlformats.org/officeDocument/2006/relationships" xmlns:p="http://schemas.openxmlformats.org/presentationml/2006/main">
+  <p:cSld>
+    <p:spTree>
+      <p:nvGrpSpPr>
+        <p:cNvPr id="1" name=""/>
+        <p:cNvGrpSpPr/>
+        <p:nvPr/>
+      </p:nvGrpSpPr>
+      <p:grpSpPr>
+        <a:xfrm>
+          <a:off x="0" y="0"/>
+          <a:ext cx="0" cy="0"/>
+          <a:chOff x="0" y="0"/>
+          <a:chExt cx="0" cy="0"/>
+        </a:xfrm>
+      </p:grpSpPr>
+      <p:sp>
+        <p:nvSpPr>
+          <p:cNvPr id="2" name="Title 1">
+            <a:extLst>
+              <a:ext uri="{FF2B5EF4-FFF2-40B4-BE49-F238E27FC236}">
+                <a16:creationId xmlns:a16="http://schemas.microsoft.com/office/drawing/2014/main" id="{37D572D4-6CED-9742-B528-2E34F57E17CD}"/>
+              </a:ext>
+            </a:extLst>
+          </p:cNvPr>
+          <p:cNvSpPr>
+            <a:spLocks noGrp="1"/>
+          </p:cNvSpPr>
+          <p:nvPr>
+            <p:ph type="title"/>
+          </p:nvPr>
+        </p:nvSpPr>
+        <p:spPr/>
+        <p:txBody>
+          <a:bodyPr/>
+          <a:lstStyle/>
+          <a:p>
+            <a:r>
+              <a:rPr lang="en-US" dirty="0"/>
+              <a:t>Roadblock (</a:t>
+            </a:r>
+            <a:r>
+              <a:rPr lang="en-US" dirty="0">
+                <a:latin typeface="Courier New" panose="02070309020205020404" pitchFamily="49" charset="0"/>
+                <a:cs typeface="Courier New" panose="02070309020205020404" pitchFamily="49" charset="0"/>
+              </a:rPr>
+              <a:t>parse_operand2())</a:t>
+            </a:r>
+          </a:p>
+        </p:txBody>
+      </p:sp>
+      <p:sp>
+        <p:nvSpPr>
+          <p:cNvPr id="3" name="Content Placeholder 2">
+            <a:extLst>
+              <a:ext uri="{FF2B5EF4-FFF2-40B4-BE49-F238E27FC236}">
+                <a16:creationId xmlns:a16="http://schemas.microsoft.com/office/drawing/2014/main" id="{1A5C0668-093D-B446-AC39-396688B48669}"/>
+              </a:ext>
+            </a:extLst>
+          </p:cNvPr>
+          <p:cNvSpPr>
+            <a:spLocks noGrp="1"/>
+          </p:cNvSpPr>
+          <p:nvPr>
+            <p:ph idx="1"/>
+          </p:nvPr>
+        </p:nvSpPr>
+        <p:spPr/>
+        <p:txBody>
+          <a:bodyPr/>
+          <a:lstStyle/>
+          <a:p>
+            <a:r>
+              <a:rPr lang="en-US" dirty="0"/>
+              <a:t>Incomplete code (not fully covering all test cases)</a:t>
+            </a:r>
+          </a:p>
+        </p:txBody>
+      </p:sp>
+      <p:sp>
+        <p:nvSpPr>
+          <p:cNvPr id="4" name="Text Placeholder 3">
+            <a:extLst>
+              <a:ext uri="{FF2B5EF4-FFF2-40B4-BE49-F238E27FC236}">
+                <a16:creationId xmlns:a16="http://schemas.microsoft.com/office/drawing/2014/main" id="{011C4B4B-BF42-B141-B5BD-050D24980C99}"/>
+              </a:ext>
+            </a:extLst>
+          </p:cNvPr>
+          <p:cNvSpPr>
+            <a:spLocks noGrp="1"/>
+          </p:cNvSpPr>
+          <p:nvPr>
+            <p:ph type="body" sz="quarter" idx="10"/>
+          </p:nvPr>
+        </p:nvSpPr>
+        <p:spPr/>
+        <p:txBody>
+          <a:bodyPr/>
+          <a:lstStyle/>
+          <a:p>
+            <a:endParaRPr lang="en-US"/>
+          </a:p>
+        </p:txBody>
+      </p:sp>
+      <p:sp>
+        <p:nvSpPr>
+          <p:cNvPr id="5" name="Text Placeholder 4">
+            <a:extLst>
+              <a:ext uri="{FF2B5EF4-FFF2-40B4-BE49-F238E27FC236}">
+                <a16:creationId xmlns:a16="http://schemas.microsoft.com/office/drawing/2014/main" id="{6C7CF212-6BED-994C-BEE1-1D028331119D}"/>
+              </a:ext>
+            </a:extLst>
+          </p:cNvPr>
+          <p:cNvSpPr>
+            <a:spLocks noGrp="1"/>
+          </p:cNvSpPr>
+          <p:nvPr>
+            <p:ph type="body" sz="quarter" idx="12"/>
+          </p:nvPr>
+        </p:nvSpPr>
+        <p:spPr/>
+        <p:txBody>
+          <a:bodyPr/>
+          <a:lstStyle/>
+          <a:p>
+            <a:endParaRPr lang="en-US"/>
+          </a:p>
+        </p:txBody>
+      </p:sp>
+    </p:spTree>
+    <p:extLst>
+      <p:ext uri="{BB962C8B-B14F-4D97-AF65-F5344CB8AC3E}">
+        <p14:creationId xmlns:p14="http://schemas.microsoft.com/office/powerpoint/2010/main" val="904256197"/>
+      </p:ext>
+    </p:extLst>
+  </p:cSld>
+  <p:clrMapOvr>
+    <a:masterClrMapping/>
+  </p:clrMapOvr>
+</p:sld>
+</file>
+
+<file path=ppt/slides/slide11.xml><?xml version="1.0" encoding="utf-8"?>
+<p:sld xmlns:a="http://schemas.openxmlformats.org/drawingml/2006/main" xmlns:r="http://schemas.openxmlformats.org/officeDocument/2006/relationships" xmlns:p="http://schemas.openxmlformats.org/presentationml/2006/main">
+  <p:cSld>
+    <p:spTree>
+      <p:nvGrpSpPr>
+        <p:cNvPr id="1" name=""/>
+        <p:cNvGrpSpPr/>
+        <p:nvPr/>
+      </p:nvGrpSpPr>
+      <p:grpSpPr>
+        <a:xfrm>
+          <a:off x="0" y="0"/>
+          <a:ext cx="0" cy="0"/>
+          <a:chOff x="0" y="0"/>
+          <a:chExt cx="0" cy="0"/>
+        </a:xfrm>
+      </p:grpSpPr>
+      <p:sp>
+        <p:nvSpPr>
+          <p:cNvPr id="18" name="Title 1">
+            <a:extLst>
+              <a:ext uri="{FF2B5EF4-FFF2-40B4-BE49-F238E27FC236}">
+                <a16:creationId xmlns:a16="http://schemas.microsoft.com/office/drawing/2014/main" id="{945957EF-ECD6-466F-9AF1-DE30DE291B11}"/>
+              </a:ext>
+            </a:extLst>
+          </p:cNvPr>
+          <p:cNvSpPr>
+            <a:spLocks noGrp="1"/>
+          </p:cNvSpPr>
+          <p:nvPr>
+            <p:ph type="title"/>
+          </p:nvPr>
+        </p:nvSpPr>
+        <p:spPr>
+          <a:xfrm>
+            <a:off x="457200" y="1487908"/>
+            <a:ext cx="8229600" cy="507556"/>
+          </a:xfrm>
+        </p:spPr>
+        <p:txBody>
+          <a:bodyPr anchor="ctr">
+            <a:normAutofit/>
+          </a:bodyPr>
+          <a:lstStyle/>
+          <a:p>
+            <a:r>
+              <a:rPr lang="en-US" dirty="0"/>
+              <a:t>General Structure</a:t>
+            </a:r>
+          </a:p>
+        </p:txBody>
+      </p:sp>
+      <p:pic>
+        <p:nvPicPr>
+          <p:cNvPr id="11" name="Content Placeholder 10" descr="Diagram&#10;&#10;Description automatically generated">
+            <a:extLst>
+              <a:ext uri="{FF2B5EF4-FFF2-40B4-BE49-F238E27FC236}">
+                <a16:creationId xmlns:a16="http://schemas.microsoft.com/office/drawing/2014/main" id="{78885A31-4BC7-DF48-BC64-D98658FBE0ED}"/>
+              </a:ext>
+            </a:extLst>
+          </p:cNvPr>
+          <p:cNvPicPr>
+            <a:picLocks noGrp="1" noChangeAspect="1"/>
+          </p:cNvPicPr>
+          <p:nvPr>
+            <p:ph idx="1"/>
+          </p:nvPr>
+        </p:nvPicPr>
+        <p:blipFill>
+          <a:blip r:embed="rId2"/>
+          <a:stretch>
+            <a:fillRect/>
+          </a:stretch>
+        </p:blipFill>
+        <p:spPr>
+          <a:xfrm>
+            <a:off x="280517" y="2311563"/>
+            <a:ext cx="8582965" cy="3755046"/>
+          </a:xfrm>
+          <a:noFill/>
+        </p:spPr>
+      </p:pic>
+      <p:sp>
+        <p:nvSpPr>
+          <p:cNvPr id="25" name="Text Placeholder 3">
+            <a:extLst>
+              <a:ext uri="{FF2B5EF4-FFF2-40B4-BE49-F238E27FC236}">
+                <a16:creationId xmlns:a16="http://schemas.microsoft.com/office/drawing/2014/main" id="{9129DD14-57A8-4CD8-BF5A-0B04F34B3B2D}"/>
+              </a:ext>
+            </a:extLst>
+          </p:cNvPr>
+          <p:cNvSpPr>
+            <a:spLocks noGrp="1"/>
+          </p:cNvSpPr>
+          <p:nvPr>
+            <p:ph type="body" sz="quarter" idx="10"/>
+          </p:nvPr>
+        </p:nvSpPr>
+        <p:spPr>
+          <a:xfrm>
+            <a:off x="6340638" y="469900"/>
+            <a:ext cx="2346162" cy="312291"/>
+          </a:xfrm>
+        </p:spPr>
+        <p:txBody>
+          <a:bodyPr/>
+          <a:lstStyle/>
+          <a:p>
+            <a:endParaRPr lang="en-US"/>
+          </a:p>
+        </p:txBody>
+      </p:sp>
+      <p:sp>
+        <p:nvSpPr>
+          <p:cNvPr id="27" name="Text Placeholder 4">
+            <a:extLst>
+              <a:ext uri="{FF2B5EF4-FFF2-40B4-BE49-F238E27FC236}">
+                <a16:creationId xmlns:a16="http://schemas.microsoft.com/office/drawing/2014/main" id="{50648A06-AA9D-401E-9A35-F8A7124DBB01}"/>
+              </a:ext>
+            </a:extLst>
+          </p:cNvPr>
+          <p:cNvSpPr>
+            <a:spLocks noGrp="1"/>
+          </p:cNvSpPr>
+          <p:nvPr>
+            <p:ph type="body" sz="quarter" idx="12"/>
+          </p:nvPr>
+        </p:nvSpPr>
+        <p:spPr>
+          <a:xfrm>
+            <a:off x="7095256" y="791391"/>
+            <a:ext cx="1591545" cy="257175"/>
+          </a:xfrm>
+        </p:spPr>
+        <p:txBody>
+          <a:bodyPr/>
+          <a:lstStyle/>
+          <a:p>
+            <a:endParaRPr lang="en-US"/>
+          </a:p>
+        </p:txBody>
+      </p:sp>
+    </p:spTree>
+    <p:extLst>
+      <p:ext uri="{BB962C8B-B14F-4D97-AF65-F5344CB8AC3E}">
+        <p14:creationId xmlns:p14="http://schemas.microsoft.com/office/powerpoint/2010/main" val="1128959539"/>
+      </p:ext>
+    </p:extLst>
+  </p:cSld>
+  <p:clrMapOvr>
+    <a:masterClrMapping/>
+  </p:clrMapOvr>
+</p:sld>
+</file>
+
 <file path=ppt/slides/slide2.xml><?xml version="1.0" encoding="utf-8"?>
 <p:sld xmlns:a="http://schemas.openxmlformats.org/drawingml/2006/main" xmlns:r="http://schemas.openxmlformats.org/officeDocument/2006/relationships" xmlns:p="http://schemas.openxmlformats.org/presentationml/2006/main">
   <p:cSld>
@@ -4586,7 +5195,7 @@
           <a:p>
             <a:r>
               <a:rPr lang="en-US" dirty="0"/>
-              <a:t>Test Cases</a:t>
+              <a:t>Emulator Test Cases</a:t>
             </a:r>
           </a:p>
         </p:txBody>
@@ -4865,7 +5474,7 @@
           <a:p>
             <a:r>
               <a:rPr lang="en-US" dirty="0"/>
-              <a:t>Interesting Test Case #1</a:t>
+              <a:t>Roadblock (CSPR flags)</a:t>
             </a:r>
           </a:p>
         </p:txBody>
@@ -4891,145 +5500,7 @@
           <a:bodyPr/>
           <a:lstStyle/>
           <a:p>
-            <a:endParaRPr lang="en-US"/>
-          </a:p>
-        </p:txBody>
-      </p:sp>
-      <p:sp>
-        <p:nvSpPr>
-          <p:cNvPr id="4" name="Text Placeholder 3">
-            <a:extLst>
-              <a:ext uri="{FF2B5EF4-FFF2-40B4-BE49-F238E27FC236}">
-                <a16:creationId xmlns:a16="http://schemas.microsoft.com/office/drawing/2014/main" id="{38E0A509-6420-6541-AF8C-479DE1B2A204}"/>
-              </a:ext>
-            </a:extLst>
-          </p:cNvPr>
-          <p:cNvSpPr>
-            <a:spLocks noGrp="1"/>
-          </p:cNvSpPr>
-          <p:nvPr>
-            <p:ph type="body" sz="quarter" idx="10"/>
-          </p:nvPr>
-        </p:nvSpPr>
-        <p:spPr/>
-        <p:txBody>
-          <a:bodyPr/>
-          <a:lstStyle/>
-          <a:p>
-            <a:endParaRPr lang="en-US"/>
-          </a:p>
-        </p:txBody>
-      </p:sp>
-      <p:sp>
-        <p:nvSpPr>
-          <p:cNvPr id="5" name="Text Placeholder 4">
-            <a:extLst>
-              <a:ext uri="{FF2B5EF4-FFF2-40B4-BE49-F238E27FC236}">
-                <a16:creationId xmlns:a16="http://schemas.microsoft.com/office/drawing/2014/main" id="{8695806B-A6C7-BA40-A63A-83C31D55ACE1}"/>
-              </a:ext>
-            </a:extLst>
-          </p:cNvPr>
-          <p:cNvSpPr>
-            <a:spLocks noGrp="1"/>
-          </p:cNvSpPr>
-          <p:nvPr>
-            <p:ph type="body" sz="quarter" idx="12"/>
-          </p:nvPr>
-        </p:nvSpPr>
-        <p:spPr/>
-        <p:txBody>
-          <a:bodyPr/>
-          <a:lstStyle/>
-          <a:p>
-            <a:endParaRPr lang="en-US"/>
-          </a:p>
-        </p:txBody>
-      </p:sp>
-    </p:spTree>
-    <p:extLst>
-      <p:ext uri="{BB962C8B-B14F-4D97-AF65-F5344CB8AC3E}">
-        <p14:creationId xmlns:p14="http://schemas.microsoft.com/office/powerpoint/2010/main" val="2890495124"/>
-      </p:ext>
-    </p:extLst>
-  </p:cSld>
-  <p:clrMapOvr>
-    <a:masterClrMapping/>
-  </p:clrMapOvr>
-</p:sld>
-</file>
-
-<file path=ppt/slides/slide5.xml><?xml version="1.0" encoding="utf-8"?>
-<p:sld xmlns:a="http://schemas.openxmlformats.org/drawingml/2006/main" xmlns:r="http://schemas.openxmlformats.org/officeDocument/2006/relationships" xmlns:p="http://schemas.openxmlformats.org/presentationml/2006/main">
-  <p:cSld>
-    <p:spTree>
-      <p:nvGrpSpPr>
-        <p:cNvPr id="1" name=""/>
-        <p:cNvGrpSpPr/>
-        <p:nvPr/>
-      </p:nvGrpSpPr>
-      <p:grpSpPr>
-        <a:xfrm>
-          <a:off x="0" y="0"/>
-          <a:ext cx="0" cy="0"/>
-          <a:chOff x="0" y="0"/>
-          <a:chExt cx="0" cy="0"/>
-        </a:xfrm>
-      </p:grpSpPr>
-      <p:sp>
-        <p:nvSpPr>
-          <p:cNvPr id="2" name="Title 1">
-            <a:extLst>
-              <a:ext uri="{FF2B5EF4-FFF2-40B4-BE49-F238E27FC236}">
-                <a16:creationId xmlns:a16="http://schemas.microsoft.com/office/drawing/2014/main" id="{43816B38-A43F-D040-95A5-7F3ADC6BCBF0}"/>
-              </a:ext>
-            </a:extLst>
-          </p:cNvPr>
-          <p:cNvSpPr>
-            <a:spLocks noGrp="1"/>
-          </p:cNvSpPr>
-          <p:nvPr>
-            <p:ph type="title"/>
-          </p:nvPr>
-        </p:nvSpPr>
-        <p:spPr/>
-        <p:txBody>
-          <a:bodyPr/>
-          <a:lstStyle/>
-          <a:p>
-            <a:r>
-              <a:rPr lang="en-US" dirty="0"/>
-              <a:t>Interesting Test </a:t>
-            </a:r>
-            <a:r>
-              <a:rPr lang="en-US"/>
-              <a:t>Case #2</a:t>
-            </a:r>
             <a:endParaRPr lang="en-US" dirty="0"/>
-          </a:p>
-        </p:txBody>
-      </p:sp>
-      <p:sp>
-        <p:nvSpPr>
-          <p:cNvPr id="3" name="Content Placeholder 2">
-            <a:extLst>
-              <a:ext uri="{FF2B5EF4-FFF2-40B4-BE49-F238E27FC236}">
-                <a16:creationId xmlns:a16="http://schemas.microsoft.com/office/drawing/2014/main" id="{5C7406A3-AE7C-4D4C-ACD1-410459D4353B}"/>
-              </a:ext>
-            </a:extLst>
-          </p:cNvPr>
-          <p:cNvSpPr>
-            <a:spLocks noGrp="1"/>
-          </p:cNvSpPr>
-          <p:nvPr>
-            <p:ph idx="1"/>
-          </p:nvPr>
-        </p:nvSpPr>
-        <p:spPr/>
-        <p:txBody>
-          <a:bodyPr/>
-          <a:lstStyle/>
-          <a:p>
-            <a:endParaRPr lang="en-US"/>
           </a:p>
         </p:txBody>
       </p:sp>
@@ -5096,7 +5567,7 @@
 </p:sld>
 </file>
 
-<file path=ppt/slides/slide6.xml><?xml version="1.0" encoding="utf-8"?>
+<file path=ppt/slides/slide5.xml><?xml version="1.0" encoding="utf-8"?>
 <p:sld xmlns:a="http://schemas.openxmlformats.org/drawingml/2006/main" xmlns:r="http://schemas.openxmlformats.org/officeDocument/2006/relationships" xmlns:p="http://schemas.openxmlformats.org/presentationml/2006/main">
   <p:cSld>
     <p:spTree>
@@ -5322,6 +5793,686 @@
     <p:extLst>
       <p:ext uri="{BB962C8B-B14F-4D97-AF65-F5344CB8AC3E}">
         <p14:creationId xmlns:p14="http://schemas.microsoft.com/office/powerpoint/2010/main" val="1563310146"/>
+      </p:ext>
+    </p:extLst>
+  </p:cSld>
+  <p:clrMapOvr>
+    <a:masterClrMapping/>
+  </p:clrMapOvr>
+</p:sld>
+</file>
+
+<file path=ppt/slides/slide6.xml><?xml version="1.0" encoding="utf-8"?>
+<p:sld xmlns:a="http://schemas.openxmlformats.org/drawingml/2006/main" xmlns:r="http://schemas.openxmlformats.org/officeDocument/2006/relationships" xmlns:p="http://schemas.openxmlformats.org/presentationml/2006/main">
+  <p:cSld>
+    <p:spTree>
+      <p:nvGrpSpPr>
+        <p:cNvPr id="1" name=""/>
+        <p:cNvGrpSpPr/>
+        <p:nvPr/>
+      </p:nvGrpSpPr>
+      <p:grpSpPr>
+        <a:xfrm>
+          <a:off x="0" y="0"/>
+          <a:ext cx="0" cy="0"/>
+          <a:chOff x="0" y="0"/>
+          <a:chExt cx="0" cy="0"/>
+        </a:xfrm>
+      </p:grpSpPr>
+      <p:sp>
+        <p:nvSpPr>
+          <p:cNvPr id="2" name="Title 1">
+            <a:extLst>
+              <a:ext uri="{FF2B5EF4-FFF2-40B4-BE49-F238E27FC236}">
+                <a16:creationId xmlns:a16="http://schemas.microsoft.com/office/drawing/2014/main" id="{D9A37852-13F1-4840-9394-A377E8B7A755}"/>
+              </a:ext>
+            </a:extLst>
+          </p:cNvPr>
+          <p:cNvSpPr>
+            <a:spLocks noGrp="1"/>
+          </p:cNvSpPr>
+          <p:nvPr>
+            <p:ph type="title"/>
+          </p:nvPr>
+        </p:nvSpPr>
+        <p:spPr/>
+        <p:txBody>
+          <a:bodyPr/>
+          <a:lstStyle/>
+          <a:p>
+            <a:r>
+              <a:rPr lang="en-US" dirty="0"/>
+              <a:t>Cyclic File Dependencies</a:t>
+            </a:r>
+          </a:p>
+        </p:txBody>
+      </p:sp>
+      <p:sp>
+        <p:nvSpPr>
+          <p:cNvPr id="3" name="Content Placeholder 2">
+            <a:extLst>
+              <a:ext uri="{FF2B5EF4-FFF2-40B4-BE49-F238E27FC236}">
+                <a16:creationId xmlns:a16="http://schemas.microsoft.com/office/drawing/2014/main" id="{B522B2DA-795F-9349-B12C-E736D769F4D1}"/>
+              </a:ext>
+            </a:extLst>
+          </p:cNvPr>
+          <p:cNvSpPr>
+            <a:spLocks noGrp="1"/>
+          </p:cNvSpPr>
+          <p:nvPr>
+            <p:ph idx="1"/>
+          </p:nvPr>
+        </p:nvSpPr>
+        <p:spPr/>
+        <p:txBody>
+          <a:bodyPr/>
+          <a:lstStyle/>
+          <a:p>
+            <a:endParaRPr lang="en-US" dirty="0"/>
+          </a:p>
+        </p:txBody>
+      </p:sp>
+      <p:sp>
+        <p:nvSpPr>
+          <p:cNvPr id="4" name="Text Placeholder 3">
+            <a:extLst>
+              <a:ext uri="{FF2B5EF4-FFF2-40B4-BE49-F238E27FC236}">
+                <a16:creationId xmlns:a16="http://schemas.microsoft.com/office/drawing/2014/main" id="{5F762001-48AC-DD4C-ADE7-88FA3D178365}"/>
+              </a:ext>
+            </a:extLst>
+          </p:cNvPr>
+          <p:cNvSpPr>
+            <a:spLocks noGrp="1"/>
+          </p:cNvSpPr>
+          <p:nvPr>
+            <p:ph type="body" sz="quarter" idx="10"/>
+          </p:nvPr>
+        </p:nvSpPr>
+        <p:spPr/>
+        <p:txBody>
+          <a:bodyPr/>
+          <a:lstStyle/>
+          <a:p>
+            <a:endParaRPr lang="en-US"/>
+          </a:p>
+        </p:txBody>
+      </p:sp>
+      <p:sp>
+        <p:nvSpPr>
+          <p:cNvPr id="5" name="Text Placeholder 4">
+            <a:extLst>
+              <a:ext uri="{FF2B5EF4-FFF2-40B4-BE49-F238E27FC236}">
+                <a16:creationId xmlns:a16="http://schemas.microsoft.com/office/drawing/2014/main" id="{66327403-22B5-E641-80DF-91C20E46442B}"/>
+              </a:ext>
+            </a:extLst>
+          </p:cNvPr>
+          <p:cNvSpPr>
+            <a:spLocks noGrp="1"/>
+          </p:cNvSpPr>
+          <p:nvPr>
+            <p:ph type="body" sz="quarter" idx="12"/>
+          </p:nvPr>
+        </p:nvSpPr>
+        <p:spPr/>
+        <p:txBody>
+          <a:bodyPr/>
+          <a:lstStyle/>
+          <a:p>
+            <a:endParaRPr lang="en-US"/>
+          </a:p>
+        </p:txBody>
+      </p:sp>
+    </p:spTree>
+    <p:extLst>
+      <p:ext uri="{BB962C8B-B14F-4D97-AF65-F5344CB8AC3E}">
+        <p14:creationId xmlns:p14="http://schemas.microsoft.com/office/powerpoint/2010/main" val="853756472"/>
+      </p:ext>
+    </p:extLst>
+  </p:cSld>
+  <p:clrMapOvr>
+    <a:masterClrMapping/>
+  </p:clrMapOvr>
+</p:sld>
+</file>
+
+<file path=ppt/slides/slide7.xml><?xml version="1.0" encoding="utf-8"?>
+<p:sld xmlns:a="http://schemas.openxmlformats.org/drawingml/2006/main" xmlns:r="http://schemas.openxmlformats.org/officeDocument/2006/relationships" xmlns:p="http://schemas.openxmlformats.org/presentationml/2006/main">
+  <p:cSld>
+    <p:spTree>
+      <p:nvGrpSpPr>
+        <p:cNvPr id="1" name=""/>
+        <p:cNvGrpSpPr/>
+        <p:nvPr/>
+      </p:nvGrpSpPr>
+      <p:grpSpPr>
+        <a:xfrm>
+          <a:off x="0" y="0"/>
+          <a:ext cx="0" cy="0"/>
+          <a:chOff x="0" y="0"/>
+          <a:chExt cx="0" cy="0"/>
+        </a:xfrm>
+      </p:grpSpPr>
+      <p:sp>
+        <p:nvSpPr>
+          <p:cNvPr id="3" name="Title 2">
+            <a:extLst>
+              <a:ext uri="{FF2B5EF4-FFF2-40B4-BE49-F238E27FC236}">
+                <a16:creationId xmlns:a16="http://schemas.microsoft.com/office/drawing/2014/main" id="{3555113C-CF6F-B449-B275-E4F07B5D17ED}"/>
+              </a:ext>
+            </a:extLst>
+          </p:cNvPr>
+          <p:cNvSpPr>
+            <a:spLocks noGrp="1"/>
+          </p:cNvSpPr>
+          <p:nvPr>
+            <p:ph type="title"/>
+          </p:nvPr>
+        </p:nvSpPr>
+        <p:spPr>
+          <a:xfrm>
+            <a:off x="2626493" y="2857500"/>
+            <a:ext cx="3891013" cy="1143000"/>
+          </a:xfrm>
+        </p:spPr>
+        <p:txBody>
+          <a:bodyPr/>
+          <a:lstStyle/>
+          <a:p>
+            <a:r>
+              <a:rPr lang="en-US" dirty="0"/>
+              <a:t>ASSEMBLER</a:t>
+            </a:r>
+          </a:p>
+        </p:txBody>
+      </p:sp>
+      <p:sp>
+        <p:nvSpPr>
+          <p:cNvPr id="5" name="Text Placeholder 4">
+            <a:extLst>
+              <a:ext uri="{FF2B5EF4-FFF2-40B4-BE49-F238E27FC236}">
+                <a16:creationId xmlns:a16="http://schemas.microsoft.com/office/drawing/2014/main" id="{65C3F126-CBDF-8748-A6EB-AB5299FE5A34}"/>
+              </a:ext>
+            </a:extLst>
+          </p:cNvPr>
+          <p:cNvSpPr>
+            <a:spLocks noGrp="1"/>
+          </p:cNvSpPr>
+          <p:nvPr>
+            <p:ph type="body" sz="quarter" idx="13"/>
+          </p:nvPr>
+        </p:nvSpPr>
+        <p:spPr/>
+        <p:txBody>
+          <a:bodyPr/>
+          <a:lstStyle/>
+          <a:p>
+            <a:endParaRPr lang="en-US"/>
+          </a:p>
+        </p:txBody>
+      </p:sp>
+    </p:spTree>
+    <p:extLst>
+      <p:ext uri="{BB962C8B-B14F-4D97-AF65-F5344CB8AC3E}">
+        <p14:creationId xmlns:p14="http://schemas.microsoft.com/office/powerpoint/2010/main" val="3735791374"/>
+      </p:ext>
+    </p:extLst>
+  </p:cSld>
+  <p:clrMapOvr>
+    <a:masterClrMapping/>
+  </p:clrMapOvr>
+</p:sld>
+</file>
+
+<file path=ppt/slides/slide8.xml><?xml version="1.0" encoding="utf-8"?>
+<p:sld xmlns:a="http://schemas.openxmlformats.org/drawingml/2006/main" xmlns:r="http://schemas.openxmlformats.org/officeDocument/2006/relationships" xmlns:p="http://schemas.openxmlformats.org/presentationml/2006/main">
+  <p:cSld>
+    <p:spTree>
+      <p:nvGrpSpPr>
+        <p:cNvPr id="1" name=""/>
+        <p:cNvGrpSpPr/>
+        <p:nvPr/>
+      </p:nvGrpSpPr>
+      <p:grpSpPr>
+        <a:xfrm>
+          <a:off x="0" y="0"/>
+          <a:ext cx="0" cy="0"/>
+          <a:chOff x="0" y="0"/>
+          <a:chExt cx="0" cy="0"/>
+        </a:xfrm>
+      </p:grpSpPr>
+      <p:sp>
+        <p:nvSpPr>
+          <p:cNvPr id="2" name="Title 1">
+            <a:extLst>
+              <a:ext uri="{FF2B5EF4-FFF2-40B4-BE49-F238E27FC236}">
+                <a16:creationId xmlns:a16="http://schemas.microsoft.com/office/drawing/2014/main" id="{025DBAA8-8B8F-2C4D-9528-35022154E179}"/>
+              </a:ext>
+            </a:extLst>
+          </p:cNvPr>
+          <p:cNvSpPr>
+            <a:spLocks noGrp="1"/>
+          </p:cNvSpPr>
+          <p:nvPr>
+            <p:ph type="title"/>
+          </p:nvPr>
+        </p:nvSpPr>
+        <p:spPr/>
+        <p:txBody>
+          <a:bodyPr/>
+          <a:lstStyle/>
+          <a:p>
+            <a:r>
+              <a:rPr lang="en-US" dirty="0"/>
+              <a:t>Assembler Test Cases</a:t>
+            </a:r>
+          </a:p>
+        </p:txBody>
+      </p:sp>
+      <p:pic>
+        <p:nvPicPr>
+          <p:cNvPr id="6" name="Screen Recording 2021-06-14 at 6.04.25 pm.mov" descr="Screen Recording 2021-06-14 at 6.04.25 pm.mov">
+            <a:hlinkClick r:id="" action="ppaction://media"/>
+            <a:extLst>
+              <a:ext uri="{FF2B5EF4-FFF2-40B4-BE49-F238E27FC236}">
+                <a16:creationId xmlns:a16="http://schemas.microsoft.com/office/drawing/2014/main" id="{0098EFFD-E415-A14A-9D99-E95EF63A383C}"/>
+              </a:ext>
+            </a:extLst>
+          </p:cNvPr>
+          <p:cNvPicPr>
+            <a:picLocks noGrp="1" noChangeAspect="1"/>
+          </p:cNvPicPr>
+          <p:nvPr>
+            <p:ph idx="1"/>
+            <a:videoFile r:link="rId2"/>
+            <p:extLst>
+              <p:ext uri="{DAA4B4D4-6D71-4841-9C94-3DE7FCFB9230}">
+                <p14:media xmlns:p14="http://schemas.microsoft.com/office/powerpoint/2010/main" r:embed="rId1"/>
+              </p:ext>
+            </p:extLst>
+          </p:nvPr>
+        </p:nvPicPr>
+        <p:blipFill>
+          <a:blip r:embed="rId4"/>
+          <a:stretch>
+            <a:fillRect/>
+          </a:stretch>
+        </p:blipFill>
+        <p:spPr>
+          <a:xfrm>
+            <a:off x="356114" y="2117557"/>
+            <a:ext cx="8431772" cy="3787040"/>
+          </a:xfrm>
+        </p:spPr>
+      </p:pic>
+      <p:sp>
+        <p:nvSpPr>
+          <p:cNvPr id="4" name="Text Placeholder 3">
+            <a:extLst>
+              <a:ext uri="{FF2B5EF4-FFF2-40B4-BE49-F238E27FC236}">
+                <a16:creationId xmlns:a16="http://schemas.microsoft.com/office/drawing/2014/main" id="{5186AF30-4EA0-F641-A0DB-52220DE597DD}"/>
+              </a:ext>
+            </a:extLst>
+          </p:cNvPr>
+          <p:cNvSpPr>
+            <a:spLocks noGrp="1"/>
+          </p:cNvSpPr>
+          <p:nvPr>
+            <p:ph type="body" sz="quarter" idx="10"/>
+          </p:nvPr>
+        </p:nvSpPr>
+        <p:spPr/>
+        <p:txBody>
+          <a:bodyPr/>
+          <a:lstStyle/>
+          <a:p>
+            <a:endParaRPr lang="en-US" dirty="0"/>
+          </a:p>
+        </p:txBody>
+      </p:sp>
+      <p:sp>
+        <p:nvSpPr>
+          <p:cNvPr id="5" name="Text Placeholder 4">
+            <a:extLst>
+              <a:ext uri="{FF2B5EF4-FFF2-40B4-BE49-F238E27FC236}">
+                <a16:creationId xmlns:a16="http://schemas.microsoft.com/office/drawing/2014/main" id="{FEA30847-2B22-7B4F-9DF6-60C1AACE8354}"/>
+              </a:ext>
+            </a:extLst>
+          </p:cNvPr>
+          <p:cNvSpPr>
+            <a:spLocks noGrp="1"/>
+          </p:cNvSpPr>
+          <p:nvPr>
+            <p:ph type="body" sz="quarter" idx="12"/>
+          </p:nvPr>
+        </p:nvSpPr>
+        <p:spPr/>
+        <p:txBody>
+          <a:bodyPr/>
+          <a:lstStyle/>
+          <a:p>
+            <a:endParaRPr lang="en-US"/>
+          </a:p>
+        </p:txBody>
+      </p:sp>
+    </p:spTree>
+    <p:extLst>
+      <p:ext uri="{BB962C8B-B14F-4D97-AF65-F5344CB8AC3E}">
+        <p14:creationId xmlns:p14="http://schemas.microsoft.com/office/powerpoint/2010/main" val="3656303320"/>
+      </p:ext>
+    </p:extLst>
+  </p:cSld>
+  <p:clrMapOvr>
+    <a:masterClrMapping/>
+  </p:clrMapOvr>
+  <p:timing>
+    <p:tnLst>
+      <p:par>
+        <p:cTn id="1" dur="indefinite" restart="never" nodeType="tmRoot">
+          <p:childTnLst>
+            <p:seq concurrent="1" nextAc="seek">
+              <p:cTn id="2" dur="indefinite" nodeType="mainSeq">
+                <p:childTnLst>
+                  <p:par>
+                    <p:cTn id="3" fill="hold">
+                      <p:stCondLst>
+                        <p:cond delay="indefinite"/>
+                      </p:stCondLst>
+                      <p:childTnLst>
+                        <p:par>
+                          <p:cTn id="4" fill="hold">
+                            <p:stCondLst>
+                              <p:cond delay="0"/>
+                            </p:stCondLst>
+                            <p:childTnLst>
+                              <p:par>
+                                <p:cTn id="5" presetID="1" presetClass="mediacall" presetSubtype="0" fill="hold" nodeType="clickEffect">
+                                  <p:stCondLst>
+                                    <p:cond delay="0"/>
+                                  </p:stCondLst>
+                                  <p:childTnLst>
+                                    <p:cmd type="call" cmd="playFrom(0.0)">
+                                      <p:cBhvr>
+                                        <p:cTn id="6" dur="10710" fill="hold"/>
+                                        <p:tgtEl>
+                                          <p:spTgt spid="6"/>
+                                        </p:tgtEl>
+                                      </p:cBhvr>
+                                    </p:cmd>
+                                  </p:childTnLst>
+                                </p:cTn>
+                              </p:par>
+                            </p:childTnLst>
+                          </p:cTn>
+                        </p:par>
+                      </p:childTnLst>
+                    </p:cTn>
+                  </p:par>
+                </p:childTnLst>
+              </p:cTn>
+              <p:prevCondLst>
+                <p:cond evt="onPrev" delay="0">
+                  <p:tgtEl>
+                    <p:sldTgt/>
+                  </p:tgtEl>
+                </p:cond>
+              </p:prevCondLst>
+              <p:nextCondLst>
+                <p:cond evt="onNext" delay="0">
+                  <p:tgtEl>
+                    <p:sldTgt/>
+                  </p:tgtEl>
+                </p:cond>
+              </p:nextCondLst>
+            </p:seq>
+            <p:video>
+              <p:cMediaNode vol="80000">
+                <p:cTn id="7" fill="hold" display="0">
+                  <p:stCondLst>
+                    <p:cond delay="indefinite"/>
+                  </p:stCondLst>
+                </p:cTn>
+                <p:tgtEl>
+                  <p:spTgt spid="6"/>
+                </p:tgtEl>
+              </p:cMediaNode>
+            </p:video>
+            <p:seq concurrent="1" nextAc="seek">
+              <p:cTn id="8" restart="whenNotActive" fill="hold" evtFilter="cancelBubble" nodeType="interactiveSeq">
+                <p:stCondLst>
+                  <p:cond evt="onClick" delay="0">
+                    <p:tgtEl>
+                      <p:spTgt spid="6"/>
+                    </p:tgtEl>
+                  </p:cond>
+                </p:stCondLst>
+                <p:endSync evt="end" delay="0">
+                  <p:rtn val="all"/>
+                </p:endSync>
+                <p:childTnLst>
+                  <p:par>
+                    <p:cTn id="9" fill="hold">
+                      <p:stCondLst>
+                        <p:cond delay="0"/>
+                      </p:stCondLst>
+                      <p:childTnLst>
+                        <p:par>
+                          <p:cTn id="10" fill="hold">
+                            <p:stCondLst>
+                              <p:cond delay="0"/>
+                            </p:stCondLst>
+                            <p:childTnLst>
+                              <p:par>
+                                <p:cTn id="11" presetID="2" presetClass="mediacall" presetSubtype="0" fill="hold" nodeType="clickEffect">
+                                  <p:stCondLst>
+                                    <p:cond delay="0"/>
+                                  </p:stCondLst>
+                                  <p:childTnLst>
+                                    <p:cmd type="call" cmd="togglePause">
+                                      <p:cBhvr>
+                                        <p:cTn id="12" dur="1" fill="hold"/>
+                                        <p:tgtEl>
+                                          <p:spTgt spid="6"/>
+                                        </p:tgtEl>
+                                      </p:cBhvr>
+                                    </p:cmd>
+                                  </p:childTnLst>
+                                </p:cTn>
+                              </p:par>
+                            </p:childTnLst>
+                          </p:cTn>
+                        </p:par>
+                      </p:childTnLst>
+                    </p:cTn>
+                  </p:par>
+                </p:childTnLst>
+              </p:cTn>
+              <p:nextCondLst>
+                <p:cond evt="onClick" delay="0">
+                  <p:tgtEl>
+                    <p:spTgt spid="6"/>
+                  </p:tgtEl>
+                </p:cond>
+              </p:nextCondLst>
+            </p:seq>
+          </p:childTnLst>
+        </p:cTn>
+      </p:par>
+    </p:tnLst>
+  </p:timing>
+</p:sld>
+</file>
+
+<file path=ppt/slides/slide9.xml><?xml version="1.0" encoding="utf-8"?>
+<p:sld xmlns:a="http://schemas.openxmlformats.org/drawingml/2006/main" xmlns:r="http://schemas.openxmlformats.org/officeDocument/2006/relationships" xmlns:p="http://schemas.openxmlformats.org/presentationml/2006/main">
+  <p:cSld>
+    <p:spTree>
+      <p:nvGrpSpPr>
+        <p:cNvPr id="1" name=""/>
+        <p:cNvGrpSpPr/>
+        <p:nvPr/>
+      </p:nvGrpSpPr>
+      <p:grpSpPr>
+        <a:xfrm>
+          <a:off x="0" y="0"/>
+          <a:ext cx="0" cy="0"/>
+          <a:chOff x="0" y="0"/>
+          <a:chExt cx="0" cy="0"/>
+        </a:xfrm>
+      </p:grpSpPr>
+      <p:sp>
+        <p:nvSpPr>
+          <p:cNvPr id="2" name="Title 1">
+            <a:extLst>
+              <a:ext uri="{FF2B5EF4-FFF2-40B4-BE49-F238E27FC236}">
+                <a16:creationId xmlns:a16="http://schemas.microsoft.com/office/drawing/2014/main" id="{2C755187-C2E4-384E-ADFB-64FE487567F7}"/>
+              </a:ext>
+            </a:extLst>
+          </p:cNvPr>
+          <p:cNvSpPr>
+            <a:spLocks noGrp="1"/>
+          </p:cNvSpPr>
+          <p:nvPr>
+            <p:ph type="title"/>
+          </p:nvPr>
+        </p:nvSpPr>
+        <p:spPr>
+          <a:xfrm>
+            <a:off x="457200" y="1487908"/>
+            <a:ext cx="8229600" cy="507556"/>
+          </a:xfrm>
+        </p:spPr>
+        <p:txBody>
+          <a:bodyPr anchor="ctr">
+            <a:normAutofit/>
+          </a:bodyPr>
+          <a:lstStyle/>
+          <a:p>
+            <a:r>
+              <a:rPr lang="en-US" dirty="0"/>
+              <a:t>Interesting Test Cases #1</a:t>
+            </a:r>
+          </a:p>
+        </p:txBody>
+      </p:sp>
+      <p:sp>
+        <p:nvSpPr>
+          <p:cNvPr id="14" name="Text Placeholder 3">
+            <a:extLst>
+              <a:ext uri="{FF2B5EF4-FFF2-40B4-BE49-F238E27FC236}">
+                <a16:creationId xmlns:a16="http://schemas.microsoft.com/office/drawing/2014/main" id="{42F2FA1B-1A14-48A0-BAFC-4DC0A925C20B}"/>
+              </a:ext>
+            </a:extLst>
+          </p:cNvPr>
+          <p:cNvSpPr>
+            <a:spLocks noGrp="1"/>
+          </p:cNvSpPr>
+          <p:nvPr>
+            <p:ph type="body" sz="quarter" idx="10"/>
+          </p:nvPr>
+        </p:nvSpPr>
+        <p:spPr>
+          <a:xfrm>
+            <a:off x="6340638" y="469900"/>
+            <a:ext cx="2346162" cy="312291"/>
+          </a:xfrm>
+        </p:spPr>
+        <p:txBody>
+          <a:bodyPr/>
+          <a:lstStyle/>
+          <a:p>
+            <a:endParaRPr lang="en-US"/>
+          </a:p>
+        </p:txBody>
+      </p:sp>
+      <p:sp>
+        <p:nvSpPr>
+          <p:cNvPr id="16" name="Content Placeholder 4">
+            <a:extLst>
+              <a:ext uri="{FF2B5EF4-FFF2-40B4-BE49-F238E27FC236}">
+                <a16:creationId xmlns:a16="http://schemas.microsoft.com/office/drawing/2014/main" id="{DCA2AB2A-6783-41E4-8898-9D9DB6284887}"/>
+              </a:ext>
+            </a:extLst>
+          </p:cNvPr>
+          <p:cNvSpPr>
+            <a:spLocks noGrp="1"/>
+          </p:cNvSpPr>
+          <p:nvPr>
+            <p:ph idx="12"/>
+          </p:nvPr>
+        </p:nvSpPr>
+        <p:spPr>
+          <a:xfrm>
+            <a:off x="4735923" y="2346581"/>
+            <a:ext cx="3950878" cy="3644104"/>
+          </a:xfrm>
+        </p:spPr>
+        <p:txBody>
+          <a:bodyPr/>
+          <a:lstStyle/>
+          <a:p>
+            <a:endParaRPr lang="en-US"/>
+          </a:p>
+        </p:txBody>
+      </p:sp>
+      <p:sp>
+        <p:nvSpPr>
+          <p:cNvPr id="18" name="Text Placeholder 5">
+            <a:extLst>
+              <a:ext uri="{FF2B5EF4-FFF2-40B4-BE49-F238E27FC236}">
+                <a16:creationId xmlns:a16="http://schemas.microsoft.com/office/drawing/2014/main" id="{B8C54E03-BD18-4B02-B3B2-53BB35BBBCE7}"/>
+              </a:ext>
+            </a:extLst>
+          </p:cNvPr>
+          <p:cNvSpPr>
+            <a:spLocks noGrp="1"/>
+          </p:cNvSpPr>
+          <p:nvPr>
+            <p:ph type="body" sz="quarter" idx="13"/>
+          </p:nvPr>
+        </p:nvSpPr>
+        <p:spPr>
+          <a:xfrm>
+            <a:off x="7095256" y="791391"/>
+            <a:ext cx="1591545" cy="257175"/>
+          </a:xfrm>
+        </p:spPr>
+        <p:txBody>
+          <a:bodyPr/>
+          <a:lstStyle/>
+          <a:p>
+            <a:endParaRPr lang="en-US"/>
+          </a:p>
+        </p:txBody>
+      </p:sp>
+      <p:sp>
+        <p:nvSpPr>
+          <p:cNvPr id="11" name="Content Placeholder 10">
+            <a:extLst>
+              <a:ext uri="{FF2B5EF4-FFF2-40B4-BE49-F238E27FC236}">
+                <a16:creationId xmlns:a16="http://schemas.microsoft.com/office/drawing/2014/main" id="{522350D3-9514-E046-913E-AC03B2D7AC57}"/>
+              </a:ext>
+            </a:extLst>
+          </p:cNvPr>
+          <p:cNvSpPr>
+            <a:spLocks noGrp="1"/>
+          </p:cNvSpPr>
+          <p:nvPr>
+            <p:ph idx="11"/>
+          </p:nvPr>
+        </p:nvSpPr>
+        <p:spPr/>
+        <p:txBody>
+          <a:bodyPr/>
+          <a:lstStyle/>
+          <a:p>
+            <a:endParaRPr lang="en-US"/>
+          </a:p>
+        </p:txBody>
+      </p:sp>
+    </p:spTree>
+    <p:extLst>
+      <p:ext uri="{BB962C8B-B14F-4D97-AF65-F5344CB8AC3E}">
+        <p14:creationId xmlns:p14="http://schemas.microsoft.com/office/powerpoint/2010/main" val="722765808"/>
       </p:ext>
     </p:extLst>
   </p:cSld>

</xml_diff>